<commit_message>
Completado la parte de FSM_TOP y sus componentes
He añadido los diagramas de síntesis y diagrama de flujo para explicar el juego.
</commit_message>
<xml_diff>
--- a/Trabajo_FPGA/Memoria/Esquemas_y_Diagramas.pptx
+++ b/Trabajo_FPGA/Memoria/Esquemas_y_Diagramas.pptx
@@ -6,6 +6,7 @@
   </p:sldMasterIdLst>
   <p:sldIdLst>
     <p:sldId id="256" r:id="rId2"/>
+    <p:sldId id="257" r:id="rId3"/>
   </p:sldIdLst>
   <p:sldSz cx="12192000" cy="6858000"/>
   <p:notesSz cx="6858000" cy="9144000"/>
@@ -259,7 +260,7 @@
           <a:p>
             <a:fld id="{D06B42BD-9ADD-40B8-BE31-81CCC25D0212}" type="datetimeFigureOut">
               <a:rPr lang="es-ES" smtClean="0"/>
-              <a:t>29/12/2021</a:t>
+              <a:t>30/12/2021</a:t>
             </a:fld>
             <a:endParaRPr lang="es-ES"/>
           </a:p>
@@ -457,7 +458,7 @@
           <a:p>
             <a:fld id="{D06B42BD-9ADD-40B8-BE31-81CCC25D0212}" type="datetimeFigureOut">
               <a:rPr lang="es-ES" smtClean="0"/>
-              <a:t>29/12/2021</a:t>
+              <a:t>30/12/2021</a:t>
             </a:fld>
             <a:endParaRPr lang="es-ES"/>
           </a:p>
@@ -665,7 +666,7 @@
           <a:p>
             <a:fld id="{D06B42BD-9ADD-40B8-BE31-81CCC25D0212}" type="datetimeFigureOut">
               <a:rPr lang="es-ES" smtClean="0"/>
-              <a:t>29/12/2021</a:t>
+              <a:t>30/12/2021</a:t>
             </a:fld>
             <a:endParaRPr lang="es-ES"/>
           </a:p>
@@ -863,7 +864,7 @@
           <a:p>
             <a:fld id="{D06B42BD-9ADD-40B8-BE31-81CCC25D0212}" type="datetimeFigureOut">
               <a:rPr lang="es-ES" smtClean="0"/>
-              <a:t>29/12/2021</a:t>
+              <a:t>30/12/2021</a:t>
             </a:fld>
             <a:endParaRPr lang="es-ES"/>
           </a:p>
@@ -1138,7 +1139,7 @@
           <a:p>
             <a:fld id="{D06B42BD-9ADD-40B8-BE31-81CCC25D0212}" type="datetimeFigureOut">
               <a:rPr lang="es-ES" smtClean="0"/>
-              <a:t>29/12/2021</a:t>
+              <a:t>30/12/2021</a:t>
             </a:fld>
             <a:endParaRPr lang="es-ES"/>
           </a:p>
@@ -1403,7 +1404,7 @@
           <a:p>
             <a:fld id="{D06B42BD-9ADD-40B8-BE31-81CCC25D0212}" type="datetimeFigureOut">
               <a:rPr lang="es-ES" smtClean="0"/>
-              <a:t>29/12/2021</a:t>
+              <a:t>30/12/2021</a:t>
             </a:fld>
             <a:endParaRPr lang="es-ES"/>
           </a:p>
@@ -1815,7 +1816,7 @@
           <a:p>
             <a:fld id="{D06B42BD-9ADD-40B8-BE31-81CCC25D0212}" type="datetimeFigureOut">
               <a:rPr lang="es-ES" smtClean="0"/>
-              <a:t>29/12/2021</a:t>
+              <a:t>30/12/2021</a:t>
             </a:fld>
             <a:endParaRPr lang="es-ES"/>
           </a:p>
@@ -1956,7 +1957,7 @@
           <a:p>
             <a:fld id="{D06B42BD-9ADD-40B8-BE31-81CCC25D0212}" type="datetimeFigureOut">
               <a:rPr lang="es-ES" smtClean="0"/>
-              <a:t>29/12/2021</a:t>
+              <a:t>30/12/2021</a:t>
             </a:fld>
             <a:endParaRPr lang="es-ES"/>
           </a:p>
@@ -2069,7 +2070,7 @@
           <a:p>
             <a:fld id="{D06B42BD-9ADD-40B8-BE31-81CCC25D0212}" type="datetimeFigureOut">
               <a:rPr lang="es-ES" smtClean="0"/>
-              <a:t>29/12/2021</a:t>
+              <a:t>30/12/2021</a:t>
             </a:fld>
             <a:endParaRPr lang="es-ES"/>
           </a:p>
@@ -2380,7 +2381,7 @@
           <a:p>
             <a:fld id="{D06B42BD-9ADD-40B8-BE31-81CCC25D0212}" type="datetimeFigureOut">
               <a:rPr lang="es-ES" smtClean="0"/>
-              <a:t>29/12/2021</a:t>
+              <a:t>30/12/2021</a:t>
             </a:fld>
             <a:endParaRPr lang="es-ES"/>
           </a:p>
@@ -2668,7 +2669,7 @@
           <a:p>
             <a:fld id="{D06B42BD-9ADD-40B8-BE31-81CCC25D0212}" type="datetimeFigureOut">
               <a:rPr lang="es-ES" smtClean="0"/>
-              <a:t>29/12/2021</a:t>
+              <a:t>30/12/2021</a:t>
             </a:fld>
             <a:endParaRPr lang="es-ES"/>
           </a:p>
@@ -2909,7 +2910,7 @@
           <a:p>
             <a:fld id="{D06B42BD-9ADD-40B8-BE31-81CCC25D0212}" type="datetimeFigureOut">
               <a:rPr lang="es-ES" smtClean="0"/>
-              <a:t>29/12/2021</a:t>
+              <a:t>30/12/2021</a:t>
             </a:fld>
             <a:endParaRPr lang="es-ES"/>
           </a:p>
@@ -9029,6 +9030,1712 @@
 </p:sld>
 </file>
 
+<file path=ppt/slides/slide2.xml><?xml version="1.0" encoding="utf-8"?>
+<p:sld xmlns:a="http://schemas.openxmlformats.org/drawingml/2006/main" xmlns:r="http://schemas.openxmlformats.org/officeDocument/2006/relationships" xmlns:p="http://schemas.openxmlformats.org/presentationml/2006/main">
+  <p:cSld>
+    <p:spTree>
+      <p:nvGrpSpPr>
+        <p:cNvPr id="1" name=""/>
+        <p:cNvGrpSpPr/>
+        <p:nvPr/>
+      </p:nvGrpSpPr>
+      <p:grpSpPr>
+        <a:xfrm>
+          <a:off x="0" y="0"/>
+          <a:ext cx="0" cy="0"/>
+          <a:chOff x="0" y="0"/>
+          <a:chExt cx="0" cy="0"/>
+        </a:xfrm>
+      </p:grpSpPr>
+      <p:sp>
+        <p:nvSpPr>
+          <p:cNvPr id="5" name="Elipse 4">
+            <a:extLst>
+              <a:ext uri="{FF2B5EF4-FFF2-40B4-BE49-F238E27FC236}">
+                <a16:creationId xmlns:a16="http://schemas.microsoft.com/office/drawing/2014/main" id="{D906F763-DB7C-40F8-81B7-0307B30362C3}"/>
+              </a:ext>
+            </a:extLst>
+          </p:cNvPr>
+          <p:cNvSpPr/>
+          <p:nvPr/>
+        </p:nvSpPr>
+        <p:spPr>
+          <a:xfrm>
+            <a:off x="3152733" y="1110574"/>
+            <a:ext cx="486383" cy="408562"/>
+          </a:xfrm>
+          <a:prstGeom prst="ellipse">
+            <a:avLst/>
+          </a:prstGeom>
+          <a:noFill/>
+          <a:ln>
+            <a:solidFill>
+              <a:schemeClr val="tx1"/>
+            </a:solidFill>
+          </a:ln>
+        </p:spPr>
+        <p:style>
+          <a:lnRef idx="2">
+            <a:schemeClr val="accent1">
+              <a:shade val="50000"/>
+            </a:schemeClr>
+          </a:lnRef>
+          <a:fillRef idx="1">
+            <a:schemeClr val="accent1"/>
+          </a:fillRef>
+          <a:effectRef idx="0">
+            <a:schemeClr val="accent1"/>
+          </a:effectRef>
+          <a:fontRef idx="minor">
+            <a:schemeClr val="lt1"/>
+          </a:fontRef>
+        </p:style>
+        <p:txBody>
+          <a:bodyPr rtlCol="0" anchor="ctr"/>
+          <a:lstStyle/>
+          <a:p>
+            <a:pPr algn="ctr"/>
+            <a:endParaRPr lang="es-ES" dirty="0"/>
+          </a:p>
+        </p:txBody>
+      </p:sp>
+      <p:sp>
+        <p:nvSpPr>
+          <p:cNvPr id="6" name="Elipse 5">
+            <a:extLst>
+              <a:ext uri="{FF2B5EF4-FFF2-40B4-BE49-F238E27FC236}">
+                <a16:creationId xmlns:a16="http://schemas.microsoft.com/office/drawing/2014/main" id="{302B3FE7-4A7A-4A08-A84F-59DC5C62FD67}"/>
+              </a:ext>
+            </a:extLst>
+          </p:cNvPr>
+          <p:cNvSpPr/>
+          <p:nvPr/>
+        </p:nvSpPr>
+        <p:spPr>
+          <a:xfrm>
+            <a:off x="3152733" y="4361559"/>
+            <a:ext cx="486383" cy="408562"/>
+          </a:xfrm>
+          <a:prstGeom prst="ellipse">
+            <a:avLst/>
+          </a:prstGeom>
+          <a:noFill/>
+          <a:ln>
+            <a:solidFill>
+              <a:schemeClr val="tx1"/>
+            </a:solidFill>
+          </a:ln>
+        </p:spPr>
+        <p:style>
+          <a:lnRef idx="2">
+            <a:schemeClr val="accent1">
+              <a:shade val="50000"/>
+            </a:schemeClr>
+          </a:lnRef>
+          <a:fillRef idx="1">
+            <a:schemeClr val="accent1"/>
+          </a:fillRef>
+          <a:effectRef idx="0">
+            <a:schemeClr val="accent1"/>
+          </a:effectRef>
+          <a:fontRef idx="minor">
+            <a:schemeClr val="lt1"/>
+          </a:fontRef>
+        </p:style>
+        <p:txBody>
+          <a:bodyPr rtlCol="0" anchor="ctr"/>
+          <a:lstStyle/>
+          <a:p>
+            <a:pPr algn="ctr"/>
+            <a:endParaRPr lang="es-ES" dirty="0"/>
+          </a:p>
+        </p:txBody>
+      </p:sp>
+      <p:sp>
+        <p:nvSpPr>
+          <p:cNvPr id="7" name="Rectángulo 6">
+            <a:extLst>
+              <a:ext uri="{FF2B5EF4-FFF2-40B4-BE49-F238E27FC236}">
+                <a16:creationId xmlns:a16="http://schemas.microsoft.com/office/drawing/2014/main" id="{01C8B9A8-D749-4EF2-97EF-36C31BF9922A}"/>
+              </a:ext>
+            </a:extLst>
+          </p:cNvPr>
+          <p:cNvSpPr/>
+          <p:nvPr/>
+        </p:nvSpPr>
+        <p:spPr>
+          <a:xfrm>
+            <a:off x="2948884" y="1686560"/>
+            <a:ext cx="894080" cy="401320"/>
+          </a:xfrm>
+          <a:prstGeom prst="rect">
+            <a:avLst/>
+          </a:prstGeom>
+          <a:noFill/>
+          <a:ln>
+            <a:solidFill>
+              <a:schemeClr val="tx1"/>
+            </a:solidFill>
+          </a:ln>
+        </p:spPr>
+        <p:style>
+          <a:lnRef idx="2">
+            <a:schemeClr val="accent1">
+              <a:shade val="50000"/>
+            </a:schemeClr>
+          </a:lnRef>
+          <a:fillRef idx="1">
+            <a:schemeClr val="accent1"/>
+          </a:fillRef>
+          <a:effectRef idx="0">
+            <a:schemeClr val="accent1"/>
+          </a:effectRef>
+          <a:fontRef idx="minor">
+            <a:schemeClr val="lt1"/>
+          </a:fontRef>
+        </p:style>
+        <p:txBody>
+          <a:bodyPr rtlCol="0" anchor="ctr"/>
+          <a:lstStyle/>
+          <a:p>
+            <a:pPr algn="ctr"/>
+            <a:endParaRPr lang="es-ES"/>
+          </a:p>
+        </p:txBody>
+      </p:sp>
+      <p:sp>
+        <p:nvSpPr>
+          <p:cNvPr id="8" name="Rombo 7">
+            <a:extLst>
+              <a:ext uri="{FF2B5EF4-FFF2-40B4-BE49-F238E27FC236}">
+                <a16:creationId xmlns:a16="http://schemas.microsoft.com/office/drawing/2014/main" id="{E1B28311-D18A-4A77-8B5A-CE98107ABB82}"/>
+              </a:ext>
+            </a:extLst>
+          </p:cNvPr>
+          <p:cNvSpPr/>
+          <p:nvPr/>
+        </p:nvSpPr>
+        <p:spPr>
+          <a:xfrm>
+            <a:off x="2973042" y="2255304"/>
+            <a:ext cx="845764" cy="401320"/>
+          </a:xfrm>
+          <a:prstGeom prst="diamond">
+            <a:avLst/>
+          </a:prstGeom>
+          <a:noFill/>
+          <a:ln>
+            <a:solidFill>
+              <a:schemeClr val="tx1"/>
+            </a:solidFill>
+          </a:ln>
+        </p:spPr>
+        <p:style>
+          <a:lnRef idx="2">
+            <a:schemeClr val="accent1">
+              <a:shade val="50000"/>
+            </a:schemeClr>
+          </a:lnRef>
+          <a:fillRef idx="1">
+            <a:schemeClr val="accent1"/>
+          </a:fillRef>
+          <a:effectRef idx="0">
+            <a:schemeClr val="accent1"/>
+          </a:effectRef>
+          <a:fontRef idx="minor">
+            <a:schemeClr val="lt1"/>
+          </a:fontRef>
+        </p:style>
+        <p:txBody>
+          <a:bodyPr rtlCol="0" anchor="ctr"/>
+          <a:lstStyle/>
+          <a:p>
+            <a:pPr algn="ctr"/>
+            <a:endParaRPr lang="es-ES"/>
+          </a:p>
+        </p:txBody>
+      </p:sp>
+      <p:sp>
+        <p:nvSpPr>
+          <p:cNvPr id="9" name="Rombo 8">
+            <a:extLst>
+              <a:ext uri="{FF2B5EF4-FFF2-40B4-BE49-F238E27FC236}">
+                <a16:creationId xmlns:a16="http://schemas.microsoft.com/office/drawing/2014/main" id="{BA24BF87-E04D-4E18-B6F3-44E5DEBCE954}"/>
+              </a:ext>
+            </a:extLst>
+          </p:cNvPr>
+          <p:cNvSpPr/>
+          <p:nvPr/>
+        </p:nvSpPr>
+        <p:spPr>
+          <a:xfrm>
+            <a:off x="1777519" y="3205480"/>
+            <a:ext cx="845764" cy="401320"/>
+          </a:xfrm>
+          <a:prstGeom prst="diamond">
+            <a:avLst/>
+          </a:prstGeom>
+          <a:noFill/>
+          <a:ln>
+            <a:solidFill>
+              <a:schemeClr val="tx1"/>
+            </a:solidFill>
+          </a:ln>
+        </p:spPr>
+        <p:style>
+          <a:lnRef idx="2">
+            <a:schemeClr val="accent1">
+              <a:shade val="50000"/>
+            </a:schemeClr>
+          </a:lnRef>
+          <a:fillRef idx="1">
+            <a:schemeClr val="accent1"/>
+          </a:fillRef>
+          <a:effectRef idx="0">
+            <a:schemeClr val="accent1"/>
+          </a:effectRef>
+          <a:fontRef idx="minor">
+            <a:schemeClr val="lt1"/>
+          </a:fontRef>
+        </p:style>
+        <p:txBody>
+          <a:bodyPr rtlCol="0" anchor="ctr"/>
+          <a:lstStyle/>
+          <a:p>
+            <a:pPr algn="ctr"/>
+            <a:endParaRPr lang="es-ES"/>
+          </a:p>
+        </p:txBody>
+      </p:sp>
+      <p:sp>
+        <p:nvSpPr>
+          <p:cNvPr id="10" name="Rombo 9">
+            <a:extLst>
+              <a:ext uri="{FF2B5EF4-FFF2-40B4-BE49-F238E27FC236}">
+                <a16:creationId xmlns:a16="http://schemas.microsoft.com/office/drawing/2014/main" id="{7F767B62-70F7-40AE-A127-1A87840C1A63}"/>
+              </a:ext>
+            </a:extLst>
+          </p:cNvPr>
+          <p:cNvSpPr/>
+          <p:nvPr/>
+        </p:nvSpPr>
+        <p:spPr>
+          <a:xfrm>
+            <a:off x="4168565" y="3205480"/>
+            <a:ext cx="845764" cy="401320"/>
+          </a:xfrm>
+          <a:prstGeom prst="diamond">
+            <a:avLst/>
+          </a:prstGeom>
+          <a:noFill/>
+          <a:ln>
+            <a:solidFill>
+              <a:schemeClr val="tx1"/>
+            </a:solidFill>
+          </a:ln>
+        </p:spPr>
+        <p:style>
+          <a:lnRef idx="2">
+            <a:schemeClr val="accent1">
+              <a:shade val="50000"/>
+            </a:schemeClr>
+          </a:lnRef>
+          <a:fillRef idx="1">
+            <a:schemeClr val="accent1"/>
+          </a:fillRef>
+          <a:effectRef idx="0">
+            <a:schemeClr val="accent1"/>
+          </a:effectRef>
+          <a:fontRef idx="minor">
+            <a:schemeClr val="lt1"/>
+          </a:fontRef>
+        </p:style>
+        <p:txBody>
+          <a:bodyPr rtlCol="0" anchor="ctr"/>
+          <a:lstStyle/>
+          <a:p>
+            <a:pPr algn="ctr"/>
+            <a:endParaRPr lang="es-ES"/>
+          </a:p>
+        </p:txBody>
+      </p:sp>
+      <p:sp>
+        <p:nvSpPr>
+          <p:cNvPr id="12" name="Rectángulo 11">
+            <a:extLst>
+              <a:ext uri="{FF2B5EF4-FFF2-40B4-BE49-F238E27FC236}">
+                <a16:creationId xmlns:a16="http://schemas.microsoft.com/office/drawing/2014/main" id="{6CD6DBC5-3929-429F-AB13-159B987536F5}"/>
+              </a:ext>
+            </a:extLst>
+          </p:cNvPr>
+          <p:cNvSpPr/>
+          <p:nvPr/>
+        </p:nvSpPr>
+        <p:spPr>
+          <a:xfrm>
+            <a:off x="4212282" y="2656624"/>
+            <a:ext cx="758330" cy="218440"/>
+          </a:xfrm>
+          <a:prstGeom prst="rect">
+            <a:avLst/>
+          </a:prstGeom>
+          <a:noFill/>
+          <a:ln>
+            <a:solidFill>
+              <a:schemeClr val="tx1"/>
+            </a:solidFill>
+          </a:ln>
+        </p:spPr>
+        <p:style>
+          <a:lnRef idx="2">
+            <a:schemeClr val="accent1">
+              <a:shade val="50000"/>
+            </a:schemeClr>
+          </a:lnRef>
+          <a:fillRef idx="1">
+            <a:schemeClr val="accent1"/>
+          </a:fillRef>
+          <a:effectRef idx="0">
+            <a:schemeClr val="accent1"/>
+          </a:effectRef>
+          <a:fontRef idx="minor">
+            <a:schemeClr val="lt1"/>
+          </a:fontRef>
+        </p:style>
+        <p:txBody>
+          <a:bodyPr rtlCol="0" anchor="ctr"/>
+          <a:lstStyle/>
+          <a:p>
+            <a:pPr algn="ctr"/>
+            <a:endParaRPr lang="es-ES"/>
+          </a:p>
+        </p:txBody>
+      </p:sp>
+      <p:sp>
+        <p:nvSpPr>
+          <p:cNvPr id="13" name="Rectángulo 12">
+            <a:extLst>
+              <a:ext uri="{FF2B5EF4-FFF2-40B4-BE49-F238E27FC236}">
+                <a16:creationId xmlns:a16="http://schemas.microsoft.com/office/drawing/2014/main" id="{E862E451-56CD-4ABE-BAB0-C4DA16CD2C7D}"/>
+              </a:ext>
+            </a:extLst>
+          </p:cNvPr>
+          <p:cNvSpPr/>
+          <p:nvPr/>
+        </p:nvSpPr>
+        <p:spPr>
+          <a:xfrm>
+            <a:off x="1821236" y="2651328"/>
+            <a:ext cx="758330" cy="218440"/>
+          </a:xfrm>
+          <a:prstGeom prst="rect">
+            <a:avLst/>
+          </a:prstGeom>
+          <a:noFill/>
+          <a:ln>
+            <a:solidFill>
+              <a:schemeClr val="tx1"/>
+            </a:solidFill>
+          </a:ln>
+        </p:spPr>
+        <p:style>
+          <a:lnRef idx="2">
+            <a:schemeClr val="accent1">
+              <a:shade val="50000"/>
+            </a:schemeClr>
+          </a:lnRef>
+          <a:fillRef idx="1">
+            <a:schemeClr val="accent1"/>
+          </a:fillRef>
+          <a:effectRef idx="0">
+            <a:schemeClr val="accent1"/>
+          </a:effectRef>
+          <a:fontRef idx="minor">
+            <a:schemeClr val="lt1"/>
+          </a:fontRef>
+        </p:style>
+        <p:txBody>
+          <a:bodyPr rtlCol="0" anchor="ctr"/>
+          <a:lstStyle/>
+          <a:p>
+            <a:pPr algn="ctr"/>
+            <a:endParaRPr lang="es-ES"/>
+          </a:p>
+        </p:txBody>
+      </p:sp>
+      <p:sp>
+        <p:nvSpPr>
+          <p:cNvPr id="14" name="Rectángulo 13">
+            <a:extLst>
+              <a:ext uri="{FF2B5EF4-FFF2-40B4-BE49-F238E27FC236}">
+                <a16:creationId xmlns:a16="http://schemas.microsoft.com/office/drawing/2014/main" id="{4A03112D-C333-4694-9424-90CA986086F8}"/>
+              </a:ext>
+            </a:extLst>
+          </p:cNvPr>
+          <p:cNvSpPr/>
+          <p:nvPr/>
+        </p:nvSpPr>
+        <p:spPr>
+          <a:xfrm>
+            <a:off x="2394403" y="3942512"/>
+            <a:ext cx="758330" cy="218440"/>
+          </a:xfrm>
+          <a:prstGeom prst="rect">
+            <a:avLst/>
+          </a:prstGeom>
+          <a:noFill/>
+          <a:ln>
+            <a:solidFill>
+              <a:schemeClr val="tx1"/>
+            </a:solidFill>
+          </a:ln>
+        </p:spPr>
+        <p:style>
+          <a:lnRef idx="2">
+            <a:schemeClr val="accent1">
+              <a:shade val="50000"/>
+            </a:schemeClr>
+          </a:lnRef>
+          <a:fillRef idx="1">
+            <a:schemeClr val="accent1"/>
+          </a:fillRef>
+          <a:effectRef idx="0">
+            <a:schemeClr val="accent1"/>
+          </a:effectRef>
+          <a:fontRef idx="minor">
+            <a:schemeClr val="lt1"/>
+          </a:fontRef>
+        </p:style>
+        <p:txBody>
+          <a:bodyPr rtlCol="0" anchor="ctr"/>
+          <a:lstStyle/>
+          <a:p>
+            <a:pPr algn="ctr"/>
+            <a:endParaRPr lang="es-ES"/>
+          </a:p>
+        </p:txBody>
+      </p:sp>
+      <p:sp>
+        <p:nvSpPr>
+          <p:cNvPr id="15" name="Rectángulo 14">
+            <a:extLst>
+              <a:ext uri="{FF2B5EF4-FFF2-40B4-BE49-F238E27FC236}">
+                <a16:creationId xmlns:a16="http://schemas.microsoft.com/office/drawing/2014/main" id="{1A6F49DC-E8B3-4325-A3B8-E9201E87E367}"/>
+              </a:ext>
+            </a:extLst>
+          </p:cNvPr>
+          <p:cNvSpPr/>
+          <p:nvPr/>
+        </p:nvSpPr>
+        <p:spPr>
+          <a:xfrm>
+            <a:off x="3639116" y="3942512"/>
+            <a:ext cx="758330" cy="218440"/>
+          </a:xfrm>
+          <a:prstGeom prst="rect">
+            <a:avLst/>
+          </a:prstGeom>
+          <a:noFill/>
+          <a:ln>
+            <a:solidFill>
+              <a:schemeClr val="tx1"/>
+            </a:solidFill>
+          </a:ln>
+        </p:spPr>
+        <p:style>
+          <a:lnRef idx="2">
+            <a:schemeClr val="accent1">
+              <a:shade val="50000"/>
+            </a:schemeClr>
+          </a:lnRef>
+          <a:fillRef idx="1">
+            <a:schemeClr val="accent1"/>
+          </a:fillRef>
+          <a:effectRef idx="0">
+            <a:schemeClr val="accent1"/>
+          </a:effectRef>
+          <a:fontRef idx="minor">
+            <a:schemeClr val="lt1"/>
+          </a:fontRef>
+        </p:style>
+        <p:txBody>
+          <a:bodyPr rtlCol="0" anchor="ctr"/>
+          <a:lstStyle/>
+          <a:p>
+            <a:pPr algn="ctr"/>
+            <a:endParaRPr lang="es-ES"/>
+          </a:p>
+        </p:txBody>
+      </p:sp>
+      <p:cxnSp>
+        <p:nvCxnSpPr>
+          <p:cNvPr id="17" name="Conector recto de flecha 16">
+            <a:extLst>
+              <a:ext uri="{FF2B5EF4-FFF2-40B4-BE49-F238E27FC236}">
+                <a16:creationId xmlns:a16="http://schemas.microsoft.com/office/drawing/2014/main" id="{181DE912-8AD0-44DA-896D-5F593A9D593C}"/>
+              </a:ext>
+            </a:extLst>
+          </p:cNvPr>
+          <p:cNvCxnSpPr>
+            <a:stCxn id="5" idx="4"/>
+            <a:endCxn id="7" idx="0"/>
+          </p:cNvCxnSpPr>
+          <p:nvPr/>
+        </p:nvCxnSpPr>
+        <p:spPr>
+          <a:xfrm flipH="1">
+            <a:off x="3395924" y="1519136"/>
+            <a:ext cx="1" cy="167424"/>
+          </a:xfrm>
+          <a:prstGeom prst="straightConnector1">
+            <a:avLst/>
+          </a:prstGeom>
+          <a:ln w="12700">
+            <a:solidFill>
+              <a:schemeClr val="tx1"/>
+            </a:solidFill>
+            <a:tailEnd type="triangle"/>
+          </a:ln>
+        </p:spPr>
+        <p:style>
+          <a:lnRef idx="1">
+            <a:schemeClr val="accent1"/>
+          </a:lnRef>
+          <a:fillRef idx="0">
+            <a:schemeClr val="accent1"/>
+          </a:fillRef>
+          <a:effectRef idx="0">
+            <a:schemeClr val="accent1"/>
+          </a:effectRef>
+          <a:fontRef idx="minor">
+            <a:schemeClr val="tx1"/>
+          </a:fontRef>
+        </p:style>
+      </p:cxnSp>
+      <p:cxnSp>
+        <p:nvCxnSpPr>
+          <p:cNvPr id="18" name="Conector recto de flecha 17">
+            <a:extLst>
+              <a:ext uri="{FF2B5EF4-FFF2-40B4-BE49-F238E27FC236}">
+                <a16:creationId xmlns:a16="http://schemas.microsoft.com/office/drawing/2014/main" id="{259274CD-D642-4CDC-90B3-6EAA3382B691}"/>
+              </a:ext>
+            </a:extLst>
+          </p:cNvPr>
+          <p:cNvCxnSpPr>
+            <a:cxnSpLocks/>
+            <a:stCxn id="7" idx="2"/>
+            <a:endCxn id="8" idx="0"/>
+          </p:cNvCxnSpPr>
+          <p:nvPr/>
+        </p:nvCxnSpPr>
+        <p:spPr>
+          <a:xfrm>
+            <a:off x="3395924" y="2087880"/>
+            <a:ext cx="0" cy="167424"/>
+          </a:xfrm>
+          <a:prstGeom prst="straightConnector1">
+            <a:avLst/>
+          </a:prstGeom>
+          <a:ln w="12700">
+            <a:solidFill>
+              <a:schemeClr val="tx1"/>
+            </a:solidFill>
+            <a:tailEnd type="triangle"/>
+          </a:ln>
+        </p:spPr>
+        <p:style>
+          <a:lnRef idx="1">
+            <a:schemeClr val="accent1"/>
+          </a:lnRef>
+          <a:fillRef idx="0">
+            <a:schemeClr val="accent1"/>
+          </a:fillRef>
+          <a:effectRef idx="0">
+            <a:schemeClr val="accent1"/>
+          </a:effectRef>
+          <a:fontRef idx="minor">
+            <a:schemeClr val="tx1"/>
+          </a:fontRef>
+        </p:style>
+      </p:cxnSp>
+      <p:cxnSp>
+        <p:nvCxnSpPr>
+          <p:cNvPr id="21" name="Conector recto de flecha 20">
+            <a:extLst>
+              <a:ext uri="{FF2B5EF4-FFF2-40B4-BE49-F238E27FC236}">
+                <a16:creationId xmlns:a16="http://schemas.microsoft.com/office/drawing/2014/main" id="{E8B69C2C-8A97-4517-B90D-B3D17D2306A4}"/>
+              </a:ext>
+            </a:extLst>
+          </p:cNvPr>
+          <p:cNvCxnSpPr>
+            <a:cxnSpLocks/>
+            <a:stCxn id="12" idx="2"/>
+            <a:endCxn id="10" idx="0"/>
+          </p:cNvCxnSpPr>
+          <p:nvPr/>
+        </p:nvCxnSpPr>
+        <p:spPr>
+          <a:xfrm>
+            <a:off x="4591447" y="2875064"/>
+            <a:ext cx="0" cy="330416"/>
+          </a:xfrm>
+          <a:prstGeom prst="straightConnector1">
+            <a:avLst/>
+          </a:prstGeom>
+          <a:ln w="12700">
+            <a:solidFill>
+              <a:schemeClr val="tx1"/>
+            </a:solidFill>
+            <a:tailEnd type="triangle"/>
+          </a:ln>
+        </p:spPr>
+        <p:style>
+          <a:lnRef idx="1">
+            <a:schemeClr val="accent1"/>
+          </a:lnRef>
+          <a:fillRef idx="0">
+            <a:schemeClr val="accent1"/>
+          </a:fillRef>
+          <a:effectRef idx="0">
+            <a:schemeClr val="accent1"/>
+          </a:effectRef>
+          <a:fontRef idx="minor">
+            <a:schemeClr val="tx1"/>
+          </a:fontRef>
+        </p:style>
+      </p:cxnSp>
+      <p:cxnSp>
+        <p:nvCxnSpPr>
+          <p:cNvPr id="25" name="Conector recto de flecha 24">
+            <a:extLst>
+              <a:ext uri="{FF2B5EF4-FFF2-40B4-BE49-F238E27FC236}">
+                <a16:creationId xmlns:a16="http://schemas.microsoft.com/office/drawing/2014/main" id="{DCC65BA1-44F4-4437-83A7-D143FC3DEC44}"/>
+              </a:ext>
+            </a:extLst>
+          </p:cNvPr>
+          <p:cNvCxnSpPr>
+            <a:cxnSpLocks/>
+            <a:stCxn id="13" idx="2"/>
+            <a:endCxn id="9" idx="0"/>
+          </p:cNvCxnSpPr>
+          <p:nvPr/>
+        </p:nvCxnSpPr>
+        <p:spPr>
+          <a:xfrm>
+            <a:off x="2200401" y="2869768"/>
+            <a:ext cx="0" cy="335712"/>
+          </a:xfrm>
+          <a:prstGeom prst="straightConnector1">
+            <a:avLst/>
+          </a:prstGeom>
+          <a:ln w="12700">
+            <a:solidFill>
+              <a:schemeClr val="tx1"/>
+            </a:solidFill>
+            <a:tailEnd type="triangle"/>
+          </a:ln>
+        </p:spPr>
+        <p:style>
+          <a:lnRef idx="1">
+            <a:schemeClr val="accent1"/>
+          </a:lnRef>
+          <a:fillRef idx="0">
+            <a:schemeClr val="accent1"/>
+          </a:fillRef>
+          <a:effectRef idx="0">
+            <a:schemeClr val="accent1"/>
+          </a:effectRef>
+          <a:fontRef idx="minor">
+            <a:schemeClr val="tx1"/>
+          </a:fontRef>
+        </p:style>
+      </p:cxnSp>
+      <p:cxnSp>
+        <p:nvCxnSpPr>
+          <p:cNvPr id="29" name="Conector: angular 28">
+            <a:extLst>
+              <a:ext uri="{FF2B5EF4-FFF2-40B4-BE49-F238E27FC236}">
+                <a16:creationId xmlns:a16="http://schemas.microsoft.com/office/drawing/2014/main" id="{BF42F163-7C6F-4199-8BC1-79D2B2584D17}"/>
+              </a:ext>
+            </a:extLst>
+          </p:cNvPr>
+          <p:cNvCxnSpPr>
+            <a:stCxn id="8" idx="3"/>
+            <a:endCxn id="12" idx="0"/>
+          </p:cNvCxnSpPr>
+          <p:nvPr/>
+        </p:nvCxnSpPr>
+        <p:spPr>
+          <a:xfrm>
+            <a:off x="3818806" y="2455964"/>
+            <a:ext cx="772641" cy="200660"/>
+          </a:xfrm>
+          <a:prstGeom prst="bentConnector2">
+            <a:avLst/>
+          </a:prstGeom>
+          <a:ln w="12700">
+            <a:solidFill>
+              <a:schemeClr val="tx1"/>
+            </a:solidFill>
+            <a:tailEnd type="triangle"/>
+          </a:ln>
+        </p:spPr>
+        <p:style>
+          <a:lnRef idx="1">
+            <a:schemeClr val="accent1"/>
+          </a:lnRef>
+          <a:fillRef idx="0">
+            <a:schemeClr val="accent1"/>
+          </a:fillRef>
+          <a:effectRef idx="0">
+            <a:schemeClr val="accent1"/>
+          </a:effectRef>
+          <a:fontRef idx="minor">
+            <a:schemeClr val="tx1"/>
+          </a:fontRef>
+        </p:style>
+      </p:cxnSp>
+      <p:cxnSp>
+        <p:nvCxnSpPr>
+          <p:cNvPr id="30" name="Conector: angular 29">
+            <a:extLst>
+              <a:ext uri="{FF2B5EF4-FFF2-40B4-BE49-F238E27FC236}">
+                <a16:creationId xmlns:a16="http://schemas.microsoft.com/office/drawing/2014/main" id="{E93AD4AF-A3DF-4C2E-B9EA-00160725B365}"/>
+              </a:ext>
+            </a:extLst>
+          </p:cNvPr>
+          <p:cNvCxnSpPr>
+            <a:cxnSpLocks/>
+            <a:stCxn id="8" idx="1"/>
+            <a:endCxn id="13" idx="0"/>
+          </p:cNvCxnSpPr>
+          <p:nvPr/>
+        </p:nvCxnSpPr>
+        <p:spPr>
+          <a:xfrm rot="10800000" flipV="1">
+            <a:off x="2200402" y="2455964"/>
+            <a:ext cx="772641" cy="195364"/>
+          </a:xfrm>
+          <a:prstGeom prst="bentConnector2">
+            <a:avLst/>
+          </a:prstGeom>
+          <a:ln w="12700">
+            <a:solidFill>
+              <a:schemeClr val="tx1"/>
+            </a:solidFill>
+            <a:tailEnd type="triangle"/>
+          </a:ln>
+        </p:spPr>
+        <p:style>
+          <a:lnRef idx="1">
+            <a:schemeClr val="accent1"/>
+          </a:lnRef>
+          <a:fillRef idx="0">
+            <a:schemeClr val="accent1"/>
+          </a:fillRef>
+          <a:effectRef idx="0">
+            <a:schemeClr val="accent1"/>
+          </a:effectRef>
+          <a:fontRef idx="minor">
+            <a:schemeClr val="tx1"/>
+          </a:fontRef>
+        </p:style>
+      </p:cxnSp>
+      <p:cxnSp>
+        <p:nvCxnSpPr>
+          <p:cNvPr id="33" name="Conector: angular 32">
+            <a:extLst>
+              <a:ext uri="{FF2B5EF4-FFF2-40B4-BE49-F238E27FC236}">
+                <a16:creationId xmlns:a16="http://schemas.microsoft.com/office/drawing/2014/main" id="{3A614E9A-EC02-4C7F-8B0B-1AC0DC3D998F}"/>
+              </a:ext>
+            </a:extLst>
+          </p:cNvPr>
+          <p:cNvCxnSpPr>
+            <a:cxnSpLocks/>
+            <a:stCxn id="9" idx="3"/>
+            <a:endCxn id="14" idx="0"/>
+          </p:cNvCxnSpPr>
+          <p:nvPr/>
+        </p:nvCxnSpPr>
+        <p:spPr>
+          <a:xfrm>
+            <a:off x="2623283" y="3406140"/>
+            <a:ext cx="150285" cy="536372"/>
+          </a:xfrm>
+          <a:prstGeom prst="bentConnector2">
+            <a:avLst/>
+          </a:prstGeom>
+          <a:ln w="12700">
+            <a:solidFill>
+              <a:schemeClr val="tx1"/>
+            </a:solidFill>
+            <a:tailEnd type="triangle"/>
+          </a:ln>
+        </p:spPr>
+        <p:style>
+          <a:lnRef idx="1">
+            <a:schemeClr val="accent1"/>
+          </a:lnRef>
+          <a:fillRef idx="0">
+            <a:schemeClr val="accent1"/>
+          </a:fillRef>
+          <a:effectRef idx="0">
+            <a:schemeClr val="accent1"/>
+          </a:effectRef>
+          <a:fontRef idx="minor">
+            <a:schemeClr val="tx1"/>
+          </a:fontRef>
+        </p:style>
+      </p:cxnSp>
+      <p:cxnSp>
+        <p:nvCxnSpPr>
+          <p:cNvPr id="36" name="Conector: angular 35">
+            <a:extLst>
+              <a:ext uri="{FF2B5EF4-FFF2-40B4-BE49-F238E27FC236}">
+                <a16:creationId xmlns:a16="http://schemas.microsoft.com/office/drawing/2014/main" id="{5DABCA73-67BF-4B2F-AE24-E91D33D1FC26}"/>
+              </a:ext>
+            </a:extLst>
+          </p:cNvPr>
+          <p:cNvCxnSpPr>
+            <a:cxnSpLocks/>
+            <a:stCxn id="10" idx="1"/>
+            <a:endCxn id="15" idx="0"/>
+          </p:cNvCxnSpPr>
+          <p:nvPr/>
+        </p:nvCxnSpPr>
+        <p:spPr>
+          <a:xfrm rot="10800000" flipV="1">
+            <a:off x="4018281" y="3406140"/>
+            <a:ext cx="150284" cy="536372"/>
+          </a:xfrm>
+          <a:prstGeom prst="bentConnector2">
+            <a:avLst/>
+          </a:prstGeom>
+          <a:ln w="12700">
+            <a:solidFill>
+              <a:schemeClr val="tx1"/>
+            </a:solidFill>
+            <a:tailEnd type="triangle"/>
+          </a:ln>
+        </p:spPr>
+        <p:style>
+          <a:lnRef idx="1">
+            <a:schemeClr val="accent1"/>
+          </a:lnRef>
+          <a:fillRef idx="0">
+            <a:schemeClr val="accent1"/>
+          </a:fillRef>
+          <a:effectRef idx="0">
+            <a:schemeClr val="accent1"/>
+          </a:effectRef>
+          <a:fontRef idx="minor">
+            <a:schemeClr val="tx1"/>
+          </a:fontRef>
+        </p:style>
+      </p:cxnSp>
+      <p:cxnSp>
+        <p:nvCxnSpPr>
+          <p:cNvPr id="39" name="Conector: angular 38">
+            <a:extLst>
+              <a:ext uri="{FF2B5EF4-FFF2-40B4-BE49-F238E27FC236}">
+                <a16:creationId xmlns:a16="http://schemas.microsoft.com/office/drawing/2014/main" id="{FC87391F-A522-4F6A-AF6D-272D2143F298}"/>
+              </a:ext>
+            </a:extLst>
+          </p:cNvPr>
+          <p:cNvCxnSpPr>
+            <a:cxnSpLocks/>
+            <a:stCxn id="15" idx="2"/>
+            <a:endCxn id="6" idx="0"/>
+          </p:cNvCxnSpPr>
+          <p:nvPr/>
+        </p:nvCxnSpPr>
+        <p:spPr>
+          <a:xfrm rot="5400000">
+            <a:off x="3606800" y="3950077"/>
+            <a:ext cx="200607" cy="622356"/>
+          </a:xfrm>
+          <a:prstGeom prst="bentConnector3">
+            <a:avLst>
+              <a:gd name="adj1" fmla="val 50000"/>
+            </a:avLst>
+          </a:prstGeom>
+          <a:ln w="12700">
+            <a:solidFill>
+              <a:schemeClr val="tx1"/>
+            </a:solidFill>
+            <a:tailEnd type="triangle"/>
+          </a:ln>
+        </p:spPr>
+        <p:style>
+          <a:lnRef idx="1">
+            <a:schemeClr val="accent1"/>
+          </a:lnRef>
+          <a:fillRef idx="0">
+            <a:schemeClr val="accent1"/>
+          </a:fillRef>
+          <a:effectRef idx="0">
+            <a:schemeClr val="accent1"/>
+          </a:effectRef>
+          <a:fontRef idx="minor">
+            <a:schemeClr val="tx1"/>
+          </a:fontRef>
+        </p:style>
+      </p:cxnSp>
+      <p:cxnSp>
+        <p:nvCxnSpPr>
+          <p:cNvPr id="42" name="Conector: angular 41">
+            <a:extLst>
+              <a:ext uri="{FF2B5EF4-FFF2-40B4-BE49-F238E27FC236}">
+                <a16:creationId xmlns:a16="http://schemas.microsoft.com/office/drawing/2014/main" id="{EFAC1F07-07EC-44CE-912F-E8C982F2E8BC}"/>
+              </a:ext>
+            </a:extLst>
+          </p:cNvPr>
+          <p:cNvCxnSpPr>
+            <a:cxnSpLocks/>
+            <a:stCxn id="14" idx="2"/>
+            <a:endCxn id="6" idx="0"/>
+          </p:cNvCxnSpPr>
+          <p:nvPr/>
+        </p:nvCxnSpPr>
+        <p:spPr>
+          <a:xfrm rot="16200000" flipH="1">
+            <a:off x="2984443" y="3950076"/>
+            <a:ext cx="200607" cy="622357"/>
+          </a:xfrm>
+          <a:prstGeom prst="bentConnector3">
+            <a:avLst>
+              <a:gd name="adj1" fmla="val 50000"/>
+            </a:avLst>
+          </a:prstGeom>
+          <a:ln w="12700">
+            <a:solidFill>
+              <a:schemeClr val="tx1"/>
+            </a:solidFill>
+            <a:tailEnd type="triangle"/>
+          </a:ln>
+        </p:spPr>
+        <p:style>
+          <a:lnRef idx="1">
+            <a:schemeClr val="accent1"/>
+          </a:lnRef>
+          <a:fillRef idx="0">
+            <a:schemeClr val="accent1"/>
+          </a:fillRef>
+          <a:effectRef idx="0">
+            <a:schemeClr val="accent1"/>
+          </a:effectRef>
+          <a:fontRef idx="minor">
+            <a:schemeClr val="tx1"/>
+          </a:fontRef>
+        </p:style>
+      </p:cxnSp>
+      <p:cxnSp>
+        <p:nvCxnSpPr>
+          <p:cNvPr id="45" name="Conector: angular 44">
+            <a:extLst>
+              <a:ext uri="{FF2B5EF4-FFF2-40B4-BE49-F238E27FC236}">
+                <a16:creationId xmlns:a16="http://schemas.microsoft.com/office/drawing/2014/main" id="{676C4E62-AF75-43D0-B8F5-61038E317A35}"/>
+              </a:ext>
+            </a:extLst>
+          </p:cNvPr>
+          <p:cNvCxnSpPr>
+            <a:cxnSpLocks/>
+            <a:stCxn id="9" idx="1"/>
+          </p:cNvCxnSpPr>
+          <p:nvPr/>
+        </p:nvCxnSpPr>
+        <p:spPr>
+          <a:xfrm rot="10800000" flipH="1">
+            <a:off x="1777518" y="2139086"/>
+            <a:ext cx="1618405" cy="1267054"/>
+          </a:xfrm>
+          <a:prstGeom prst="bentConnector3">
+            <a:avLst>
+              <a:gd name="adj1" fmla="val -14125"/>
+            </a:avLst>
+          </a:prstGeom>
+          <a:ln w="12700">
+            <a:solidFill>
+              <a:schemeClr val="tx1"/>
+            </a:solidFill>
+            <a:tailEnd type="triangle"/>
+          </a:ln>
+        </p:spPr>
+        <p:style>
+          <a:lnRef idx="1">
+            <a:schemeClr val="accent1"/>
+          </a:lnRef>
+          <a:fillRef idx="0">
+            <a:schemeClr val="accent1"/>
+          </a:fillRef>
+          <a:effectRef idx="0">
+            <a:schemeClr val="accent1"/>
+          </a:effectRef>
+          <a:fontRef idx="minor">
+            <a:schemeClr val="tx1"/>
+          </a:fontRef>
+        </p:style>
+      </p:cxnSp>
+      <p:cxnSp>
+        <p:nvCxnSpPr>
+          <p:cNvPr id="48" name="Conector: angular 47">
+            <a:extLst>
+              <a:ext uri="{FF2B5EF4-FFF2-40B4-BE49-F238E27FC236}">
+                <a16:creationId xmlns:a16="http://schemas.microsoft.com/office/drawing/2014/main" id="{FB53E650-745C-47C2-8248-B8851124FC1D}"/>
+              </a:ext>
+            </a:extLst>
+          </p:cNvPr>
+          <p:cNvCxnSpPr>
+            <a:cxnSpLocks/>
+            <a:stCxn id="10" idx="3"/>
+          </p:cNvCxnSpPr>
+          <p:nvPr/>
+        </p:nvCxnSpPr>
+        <p:spPr>
+          <a:xfrm flipH="1" flipV="1">
+            <a:off x="3395923" y="2139086"/>
+            <a:ext cx="1618406" cy="1267054"/>
+          </a:xfrm>
+          <a:prstGeom prst="bentConnector3">
+            <a:avLst>
+              <a:gd name="adj1" fmla="val -14125"/>
+            </a:avLst>
+          </a:prstGeom>
+          <a:ln w="12700">
+            <a:solidFill>
+              <a:schemeClr val="tx1"/>
+            </a:solidFill>
+            <a:tailEnd type="triangle"/>
+          </a:ln>
+        </p:spPr>
+        <p:style>
+          <a:lnRef idx="1">
+            <a:schemeClr val="accent1"/>
+          </a:lnRef>
+          <a:fillRef idx="0">
+            <a:schemeClr val="accent1"/>
+          </a:fillRef>
+          <a:effectRef idx="0">
+            <a:schemeClr val="accent1"/>
+          </a:effectRef>
+          <a:fontRef idx="minor">
+            <a:schemeClr val="tx1"/>
+          </a:fontRef>
+        </p:style>
+      </p:cxnSp>
+      <p:sp>
+        <p:nvSpPr>
+          <p:cNvPr id="51" name="CuadroTexto 50">
+            <a:extLst>
+              <a:ext uri="{FF2B5EF4-FFF2-40B4-BE49-F238E27FC236}">
+                <a16:creationId xmlns:a16="http://schemas.microsoft.com/office/drawing/2014/main" id="{7BBE9817-62DA-49F3-9882-DA686436B025}"/>
+              </a:ext>
+            </a:extLst>
+          </p:cNvPr>
+          <p:cNvSpPr txBox="1"/>
+          <p:nvPr/>
+        </p:nvSpPr>
+        <p:spPr>
+          <a:xfrm>
+            <a:off x="2866149" y="1713487"/>
+            <a:ext cx="1059548" cy="338554"/>
+          </a:xfrm>
+          <a:prstGeom prst="rect">
+            <a:avLst/>
+          </a:prstGeom>
+          <a:noFill/>
+        </p:spPr>
+        <p:txBody>
+          <a:bodyPr wrap="square" rtlCol="0">
+            <a:spAutoFit/>
+          </a:bodyPr>
+          <a:lstStyle/>
+          <a:p>
+            <a:pPr algn="ctr"/>
+            <a:r>
+              <a:rPr lang="es-ES" sz="800" b="1" dirty="0"/>
+              <a:t>Generación de secuencia aleatoria</a:t>
+            </a:r>
+          </a:p>
+        </p:txBody>
+      </p:sp>
+      <p:sp>
+        <p:nvSpPr>
+          <p:cNvPr id="52" name="CuadroTexto 51">
+            <a:extLst>
+              <a:ext uri="{FF2B5EF4-FFF2-40B4-BE49-F238E27FC236}">
+                <a16:creationId xmlns:a16="http://schemas.microsoft.com/office/drawing/2014/main" id="{29D8B5C1-F2AA-4D28-897D-0103796FBF61}"/>
+              </a:ext>
+            </a:extLst>
+          </p:cNvPr>
+          <p:cNvSpPr txBox="1"/>
+          <p:nvPr/>
+        </p:nvSpPr>
+        <p:spPr>
+          <a:xfrm>
+            <a:off x="2866149" y="1204955"/>
+            <a:ext cx="1059548" cy="215444"/>
+          </a:xfrm>
+          <a:prstGeom prst="rect">
+            <a:avLst/>
+          </a:prstGeom>
+          <a:noFill/>
+        </p:spPr>
+        <p:txBody>
+          <a:bodyPr wrap="square" rtlCol="0">
+            <a:spAutoFit/>
+          </a:bodyPr>
+          <a:lstStyle/>
+          <a:p>
+            <a:pPr algn="ctr"/>
+            <a:r>
+              <a:rPr lang="es-ES" sz="800" b="1" dirty="0"/>
+              <a:t>INICIO</a:t>
+            </a:r>
+          </a:p>
+        </p:txBody>
+      </p:sp>
+      <p:sp>
+        <p:nvSpPr>
+          <p:cNvPr id="53" name="CuadroTexto 52">
+            <a:extLst>
+              <a:ext uri="{FF2B5EF4-FFF2-40B4-BE49-F238E27FC236}">
+                <a16:creationId xmlns:a16="http://schemas.microsoft.com/office/drawing/2014/main" id="{29B20B99-984F-451A-A8D9-03FEA9F6AC8E}"/>
+              </a:ext>
+            </a:extLst>
+          </p:cNvPr>
+          <p:cNvSpPr txBox="1"/>
+          <p:nvPr/>
+        </p:nvSpPr>
+        <p:spPr>
+          <a:xfrm>
+            <a:off x="2866149" y="4458118"/>
+            <a:ext cx="1059548" cy="215444"/>
+          </a:xfrm>
+          <a:prstGeom prst="rect">
+            <a:avLst/>
+          </a:prstGeom>
+          <a:noFill/>
+        </p:spPr>
+        <p:txBody>
+          <a:bodyPr wrap="square" rtlCol="0">
+            <a:spAutoFit/>
+          </a:bodyPr>
+          <a:lstStyle/>
+          <a:p>
+            <a:pPr algn="ctr"/>
+            <a:r>
+              <a:rPr lang="es-ES" sz="800" b="1" dirty="0"/>
+              <a:t>FIN</a:t>
+            </a:r>
+          </a:p>
+        </p:txBody>
+      </p:sp>
+      <p:sp>
+        <p:nvSpPr>
+          <p:cNvPr id="54" name="CuadroTexto 53">
+            <a:extLst>
+              <a:ext uri="{FF2B5EF4-FFF2-40B4-BE49-F238E27FC236}">
+                <a16:creationId xmlns:a16="http://schemas.microsoft.com/office/drawing/2014/main" id="{F08E1DB6-9E80-40B3-9BE1-ADB1E3200D79}"/>
+              </a:ext>
+            </a:extLst>
+          </p:cNvPr>
+          <p:cNvSpPr txBox="1"/>
+          <p:nvPr/>
+        </p:nvSpPr>
+        <p:spPr>
+          <a:xfrm>
+            <a:off x="1670626" y="2649041"/>
+            <a:ext cx="1059548" cy="215444"/>
+          </a:xfrm>
+          <a:prstGeom prst="rect">
+            <a:avLst/>
+          </a:prstGeom>
+          <a:noFill/>
+        </p:spPr>
+        <p:txBody>
+          <a:bodyPr wrap="square" rtlCol="0">
+            <a:spAutoFit/>
+          </a:bodyPr>
+          <a:lstStyle/>
+          <a:p>
+            <a:pPr algn="ctr"/>
+            <a:r>
+              <a:rPr lang="es-ES" sz="800" b="1" dirty="0"/>
+              <a:t>i = i - 1 </a:t>
+            </a:r>
+          </a:p>
+        </p:txBody>
+      </p:sp>
+      <p:sp>
+        <p:nvSpPr>
+          <p:cNvPr id="55" name="CuadroTexto 54">
+            <a:extLst>
+              <a:ext uri="{FF2B5EF4-FFF2-40B4-BE49-F238E27FC236}">
+                <a16:creationId xmlns:a16="http://schemas.microsoft.com/office/drawing/2014/main" id="{E5514304-96D9-48E9-8777-58414FE7CD94}"/>
+              </a:ext>
+            </a:extLst>
+          </p:cNvPr>
+          <p:cNvSpPr txBox="1"/>
+          <p:nvPr/>
+        </p:nvSpPr>
+        <p:spPr>
+          <a:xfrm>
+            <a:off x="4061672" y="2649041"/>
+            <a:ext cx="1059548" cy="215444"/>
+          </a:xfrm>
+          <a:prstGeom prst="rect">
+            <a:avLst/>
+          </a:prstGeom>
+          <a:noFill/>
+        </p:spPr>
+        <p:txBody>
+          <a:bodyPr wrap="square" rtlCol="0">
+            <a:spAutoFit/>
+          </a:bodyPr>
+          <a:lstStyle/>
+          <a:p>
+            <a:pPr algn="ctr"/>
+            <a:r>
+              <a:rPr lang="es-ES" sz="800" b="1" dirty="0"/>
+              <a:t>try = try - 1 </a:t>
+            </a:r>
+          </a:p>
+        </p:txBody>
+      </p:sp>
+      <p:sp>
+        <p:nvSpPr>
+          <p:cNvPr id="56" name="CuadroTexto 55">
+            <a:extLst>
+              <a:ext uri="{FF2B5EF4-FFF2-40B4-BE49-F238E27FC236}">
+                <a16:creationId xmlns:a16="http://schemas.microsoft.com/office/drawing/2014/main" id="{03C76A40-8163-4790-A3B8-9F938D12CAAA}"/>
+              </a:ext>
+            </a:extLst>
+          </p:cNvPr>
+          <p:cNvSpPr txBox="1"/>
+          <p:nvPr/>
+        </p:nvSpPr>
+        <p:spPr>
+          <a:xfrm>
+            <a:off x="1675438" y="3298420"/>
+            <a:ext cx="1059548" cy="215444"/>
+          </a:xfrm>
+          <a:prstGeom prst="rect">
+            <a:avLst/>
+          </a:prstGeom>
+          <a:noFill/>
+        </p:spPr>
+        <p:txBody>
+          <a:bodyPr wrap="square" rtlCol="0">
+            <a:spAutoFit/>
+          </a:bodyPr>
+          <a:lstStyle/>
+          <a:p>
+            <a:pPr algn="ctr"/>
+            <a:r>
+              <a:rPr lang="es-ES" sz="800" b="1" dirty="0"/>
+              <a:t>¿i &lt; 0? </a:t>
+            </a:r>
+          </a:p>
+        </p:txBody>
+      </p:sp>
+      <p:sp>
+        <p:nvSpPr>
+          <p:cNvPr id="57" name="CuadroTexto 56">
+            <a:extLst>
+              <a:ext uri="{FF2B5EF4-FFF2-40B4-BE49-F238E27FC236}">
+                <a16:creationId xmlns:a16="http://schemas.microsoft.com/office/drawing/2014/main" id="{337F7F99-C5F9-4839-8E21-3FB1D4E901F1}"/>
+              </a:ext>
+            </a:extLst>
+          </p:cNvPr>
+          <p:cNvSpPr txBox="1"/>
+          <p:nvPr/>
+        </p:nvSpPr>
+        <p:spPr>
+          <a:xfrm>
+            <a:off x="4056860" y="3291000"/>
+            <a:ext cx="1059548" cy="215444"/>
+          </a:xfrm>
+          <a:prstGeom prst="rect">
+            <a:avLst/>
+          </a:prstGeom>
+          <a:noFill/>
+        </p:spPr>
+        <p:txBody>
+          <a:bodyPr wrap="square" rtlCol="0">
+            <a:spAutoFit/>
+          </a:bodyPr>
+          <a:lstStyle/>
+          <a:p>
+            <a:pPr algn="ctr"/>
+            <a:r>
+              <a:rPr lang="es-ES" sz="800" b="1" dirty="0"/>
+              <a:t>¿try = 0?</a:t>
+            </a:r>
+          </a:p>
+        </p:txBody>
+      </p:sp>
+      <p:sp>
+        <p:nvSpPr>
+          <p:cNvPr id="58" name="CuadroTexto 57">
+            <a:extLst>
+              <a:ext uri="{FF2B5EF4-FFF2-40B4-BE49-F238E27FC236}">
+                <a16:creationId xmlns:a16="http://schemas.microsoft.com/office/drawing/2014/main" id="{E5AAFE5A-654C-43D6-B6AA-5019C1CB1772}"/>
+              </a:ext>
+            </a:extLst>
+          </p:cNvPr>
+          <p:cNvSpPr txBox="1"/>
+          <p:nvPr/>
+        </p:nvSpPr>
+        <p:spPr>
+          <a:xfrm>
+            <a:off x="3488506" y="3949931"/>
+            <a:ext cx="1059548" cy="215444"/>
+          </a:xfrm>
+          <a:prstGeom prst="rect">
+            <a:avLst/>
+          </a:prstGeom>
+          <a:noFill/>
+        </p:spPr>
+        <p:txBody>
+          <a:bodyPr wrap="square" rtlCol="0">
+            <a:spAutoFit/>
+          </a:bodyPr>
+          <a:lstStyle/>
+          <a:p>
+            <a:pPr algn="ctr"/>
+            <a:r>
+              <a:rPr lang="es-ES" sz="800" b="1" dirty="0"/>
+              <a:t>GAME OVER</a:t>
+            </a:r>
+          </a:p>
+        </p:txBody>
+      </p:sp>
+      <p:sp>
+        <p:nvSpPr>
+          <p:cNvPr id="59" name="CuadroTexto 58">
+            <a:extLst>
+              <a:ext uri="{FF2B5EF4-FFF2-40B4-BE49-F238E27FC236}">
+                <a16:creationId xmlns:a16="http://schemas.microsoft.com/office/drawing/2014/main" id="{2A1B0AC3-84B8-4872-AE9B-4B36BFCD0C3E}"/>
+              </a:ext>
+            </a:extLst>
+          </p:cNvPr>
+          <p:cNvSpPr txBox="1"/>
+          <p:nvPr/>
+        </p:nvSpPr>
+        <p:spPr>
+          <a:xfrm>
+            <a:off x="2229737" y="3938950"/>
+            <a:ext cx="1059548" cy="215444"/>
+          </a:xfrm>
+          <a:prstGeom prst="rect">
+            <a:avLst/>
+          </a:prstGeom>
+          <a:noFill/>
+        </p:spPr>
+        <p:txBody>
+          <a:bodyPr wrap="square" rtlCol="0">
+            <a:spAutoFit/>
+          </a:bodyPr>
+          <a:lstStyle/>
+          <a:p>
+            <a:pPr algn="ctr"/>
+            <a:r>
+              <a:rPr lang="es-ES" sz="800" b="1" dirty="0"/>
+              <a:t>WIN</a:t>
+            </a:r>
+          </a:p>
+        </p:txBody>
+      </p:sp>
+      <p:sp>
+        <p:nvSpPr>
+          <p:cNvPr id="60" name="CuadroTexto 59">
+            <a:extLst>
+              <a:ext uri="{FF2B5EF4-FFF2-40B4-BE49-F238E27FC236}">
+                <a16:creationId xmlns:a16="http://schemas.microsoft.com/office/drawing/2014/main" id="{E1221079-348C-41CC-87B6-512CDF4B1697}"/>
+              </a:ext>
+            </a:extLst>
+          </p:cNvPr>
+          <p:cNvSpPr txBox="1"/>
+          <p:nvPr/>
+        </p:nvSpPr>
+        <p:spPr>
+          <a:xfrm>
+            <a:off x="2866148" y="2348190"/>
+            <a:ext cx="1059548" cy="215444"/>
+          </a:xfrm>
+          <a:prstGeom prst="rect">
+            <a:avLst/>
+          </a:prstGeom>
+          <a:noFill/>
+        </p:spPr>
+        <p:txBody>
+          <a:bodyPr wrap="square" rtlCol="0">
+            <a:spAutoFit/>
+          </a:bodyPr>
+          <a:lstStyle/>
+          <a:p>
+            <a:pPr algn="ctr"/>
+            <a:r>
+              <a:rPr lang="es-ES" sz="800" b="1" dirty="0"/>
+              <a:t>¿btn = seq[i]?</a:t>
+            </a:r>
+          </a:p>
+        </p:txBody>
+      </p:sp>
+      <p:sp>
+        <p:nvSpPr>
+          <p:cNvPr id="61" name="CuadroTexto 60">
+            <a:extLst>
+              <a:ext uri="{FF2B5EF4-FFF2-40B4-BE49-F238E27FC236}">
+                <a16:creationId xmlns:a16="http://schemas.microsoft.com/office/drawing/2014/main" id="{93C3BCFB-0046-407C-A989-0C788CC46227}"/>
+              </a:ext>
+            </a:extLst>
+          </p:cNvPr>
+          <p:cNvSpPr txBox="1"/>
+          <p:nvPr/>
+        </p:nvSpPr>
+        <p:spPr>
+          <a:xfrm>
+            <a:off x="1529965" y="3217482"/>
+            <a:ext cx="335160" cy="215444"/>
+          </a:xfrm>
+          <a:prstGeom prst="rect">
+            <a:avLst/>
+          </a:prstGeom>
+          <a:noFill/>
+        </p:spPr>
+        <p:txBody>
+          <a:bodyPr wrap="square" rtlCol="0">
+            <a:spAutoFit/>
+          </a:bodyPr>
+          <a:lstStyle/>
+          <a:p>
+            <a:pPr algn="ctr"/>
+            <a:r>
+              <a:rPr lang="es-ES" sz="800" b="1" dirty="0">
+                <a:solidFill>
+                  <a:srgbClr val="FF0000"/>
+                </a:solidFill>
+              </a:rPr>
+              <a:t>NO</a:t>
+            </a:r>
+          </a:p>
+        </p:txBody>
+      </p:sp>
+      <p:sp>
+        <p:nvSpPr>
+          <p:cNvPr id="62" name="CuadroTexto 61">
+            <a:extLst>
+              <a:ext uri="{FF2B5EF4-FFF2-40B4-BE49-F238E27FC236}">
+                <a16:creationId xmlns:a16="http://schemas.microsoft.com/office/drawing/2014/main" id="{6567427E-EE65-4E11-A365-3ABFB28A3D36}"/>
+              </a:ext>
+            </a:extLst>
+          </p:cNvPr>
+          <p:cNvSpPr txBox="1"/>
+          <p:nvPr/>
+        </p:nvSpPr>
+        <p:spPr>
+          <a:xfrm>
+            <a:off x="3745683" y="2262818"/>
+            <a:ext cx="335160" cy="215444"/>
+          </a:xfrm>
+          <a:prstGeom prst="rect">
+            <a:avLst/>
+          </a:prstGeom>
+          <a:noFill/>
+        </p:spPr>
+        <p:txBody>
+          <a:bodyPr wrap="square" rtlCol="0">
+            <a:spAutoFit/>
+          </a:bodyPr>
+          <a:lstStyle/>
+          <a:p>
+            <a:pPr algn="ctr"/>
+            <a:r>
+              <a:rPr lang="es-ES" sz="800" b="1" dirty="0">
+                <a:solidFill>
+                  <a:srgbClr val="FF0000"/>
+                </a:solidFill>
+              </a:rPr>
+              <a:t>NO</a:t>
+            </a:r>
+          </a:p>
+        </p:txBody>
+      </p:sp>
+      <p:sp>
+        <p:nvSpPr>
+          <p:cNvPr id="63" name="CuadroTexto 62">
+            <a:extLst>
+              <a:ext uri="{FF2B5EF4-FFF2-40B4-BE49-F238E27FC236}">
+                <a16:creationId xmlns:a16="http://schemas.microsoft.com/office/drawing/2014/main" id="{739380CC-A4A5-466B-85B9-09CC42502A5E}"/>
+              </a:ext>
+            </a:extLst>
+          </p:cNvPr>
+          <p:cNvSpPr txBox="1"/>
+          <p:nvPr/>
+        </p:nvSpPr>
+        <p:spPr>
+          <a:xfrm>
+            <a:off x="4927518" y="3232302"/>
+            <a:ext cx="335160" cy="215444"/>
+          </a:xfrm>
+          <a:prstGeom prst="rect">
+            <a:avLst/>
+          </a:prstGeom>
+          <a:noFill/>
+        </p:spPr>
+        <p:txBody>
+          <a:bodyPr wrap="square" rtlCol="0">
+            <a:spAutoFit/>
+          </a:bodyPr>
+          <a:lstStyle/>
+          <a:p>
+            <a:pPr algn="ctr"/>
+            <a:r>
+              <a:rPr lang="es-ES" sz="800" b="1" dirty="0">
+                <a:solidFill>
+                  <a:srgbClr val="FF0000"/>
+                </a:solidFill>
+              </a:rPr>
+              <a:t>NO</a:t>
+            </a:r>
+          </a:p>
+        </p:txBody>
+      </p:sp>
+      <p:sp>
+        <p:nvSpPr>
+          <p:cNvPr id="64" name="CuadroTexto 63">
+            <a:extLst>
+              <a:ext uri="{FF2B5EF4-FFF2-40B4-BE49-F238E27FC236}">
+                <a16:creationId xmlns:a16="http://schemas.microsoft.com/office/drawing/2014/main" id="{CCAF14F7-3AB4-4DCC-8612-9FC48C770BE0}"/>
+              </a:ext>
+            </a:extLst>
+          </p:cNvPr>
+          <p:cNvSpPr txBox="1"/>
+          <p:nvPr/>
+        </p:nvSpPr>
+        <p:spPr>
+          <a:xfrm>
+            <a:off x="2516480" y="3197254"/>
+            <a:ext cx="335160" cy="215444"/>
+          </a:xfrm>
+          <a:prstGeom prst="rect">
+            <a:avLst/>
+          </a:prstGeom>
+          <a:noFill/>
+        </p:spPr>
+        <p:txBody>
+          <a:bodyPr wrap="square" rtlCol="0">
+            <a:spAutoFit/>
+          </a:bodyPr>
+          <a:lstStyle/>
+          <a:p>
+            <a:pPr algn="ctr"/>
+            <a:r>
+              <a:rPr lang="es-ES" sz="800" b="1" dirty="0">
+                <a:solidFill>
+                  <a:srgbClr val="00B050"/>
+                </a:solidFill>
+              </a:rPr>
+              <a:t>SI</a:t>
+            </a:r>
+          </a:p>
+        </p:txBody>
+      </p:sp>
+      <p:sp>
+        <p:nvSpPr>
+          <p:cNvPr id="65" name="CuadroTexto 64">
+            <a:extLst>
+              <a:ext uri="{FF2B5EF4-FFF2-40B4-BE49-F238E27FC236}">
+                <a16:creationId xmlns:a16="http://schemas.microsoft.com/office/drawing/2014/main" id="{48F73931-5262-4F24-A354-C9BE2E15FF38}"/>
+              </a:ext>
+            </a:extLst>
+          </p:cNvPr>
+          <p:cNvSpPr txBox="1"/>
+          <p:nvPr/>
+        </p:nvSpPr>
+        <p:spPr>
+          <a:xfrm>
+            <a:off x="2715457" y="2255803"/>
+            <a:ext cx="335160" cy="215444"/>
+          </a:xfrm>
+          <a:prstGeom prst="rect">
+            <a:avLst/>
+          </a:prstGeom>
+          <a:noFill/>
+        </p:spPr>
+        <p:txBody>
+          <a:bodyPr wrap="square" rtlCol="0">
+            <a:spAutoFit/>
+          </a:bodyPr>
+          <a:lstStyle/>
+          <a:p>
+            <a:pPr algn="ctr"/>
+            <a:r>
+              <a:rPr lang="es-ES" sz="800" b="1" dirty="0">
+                <a:solidFill>
+                  <a:srgbClr val="00B050"/>
+                </a:solidFill>
+              </a:rPr>
+              <a:t>SI</a:t>
+            </a:r>
+          </a:p>
+        </p:txBody>
+      </p:sp>
+      <p:sp>
+        <p:nvSpPr>
+          <p:cNvPr id="66" name="CuadroTexto 65">
+            <a:extLst>
+              <a:ext uri="{FF2B5EF4-FFF2-40B4-BE49-F238E27FC236}">
+                <a16:creationId xmlns:a16="http://schemas.microsoft.com/office/drawing/2014/main" id="{B599BE64-B975-4CBC-9FE3-CE6DDE9309A1}"/>
+              </a:ext>
+            </a:extLst>
+          </p:cNvPr>
+          <p:cNvSpPr txBox="1"/>
+          <p:nvPr/>
+        </p:nvSpPr>
+        <p:spPr>
+          <a:xfrm>
+            <a:off x="3939740" y="3200266"/>
+            <a:ext cx="335160" cy="215444"/>
+          </a:xfrm>
+          <a:prstGeom prst="rect">
+            <a:avLst/>
+          </a:prstGeom>
+          <a:noFill/>
+        </p:spPr>
+        <p:txBody>
+          <a:bodyPr wrap="square" rtlCol="0">
+            <a:spAutoFit/>
+          </a:bodyPr>
+          <a:lstStyle/>
+          <a:p>
+            <a:pPr algn="ctr"/>
+            <a:r>
+              <a:rPr lang="es-ES" sz="800" b="1" dirty="0">
+                <a:solidFill>
+                  <a:srgbClr val="00B050"/>
+                </a:solidFill>
+              </a:rPr>
+              <a:t>SI</a:t>
+            </a:r>
+          </a:p>
+        </p:txBody>
+      </p:sp>
+    </p:spTree>
+    <p:extLst>
+      <p:ext uri="{BB962C8B-B14F-4D97-AF65-F5344CB8AC3E}">
+        <p14:creationId xmlns:p14="http://schemas.microsoft.com/office/powerpoint/2010/main" val="1478048975"/>
+      </p:ext>
+    </p:extLst>
+  </p:cSld>
+  <p:clrMapOvr>
+    <a:masterClrMapping/>
+  </p:clrMapOvr>
+</p:sld>
+</file>
+
 <file path=ppt/theme/theme1.xml><?xml version="1.0" encoding="utf-8"?>
 <a:theme xmlns:a="http://schemas.openxmlformats.org/drawingml/2006/main" name="Tema de Office">
   <a:themeElements>

</xml_diff>

<commit_message>
MEMO VHDL casi finalizada
Solo falta repasar y meter fotos
</commit_message>
<xml_diff>
--- a/Trabajo_FPGA/Memoria/Esquemas_y_Diagramas.pptx
+++ b/Trabajo_FPGA/Memoria/Esquemas_y_Diagramas.pptx
@@ -7,6 +7,7 @@
   <p:sldIdLst>
     <p:sldId id="256" r:id="rId2"/>
     <p:sldId id="257" r:id="rId3"/>
+    <p:sldId id="258" r:id="rId4"/>
   </p:sldIdLst>
   <p:sldSz cx="12192000" cy="6858000"/>
   <p:notesSz cx="6858000" cy="9144000"/>
@@ -260,7 +261,7 @@
           <a:p>
             <a:fld id="{D06B42BD-9ADD-40B8-BE31-81CCC25D0212}" type="datetimeFigureOut">
               <a:rPr lang="es-ES" smtClean="0"/>
-              <a:t>30/12/2021</a:t>
+              <a:t>09/01/2022</a:t>
             </a:fld>
             <a:endParaRPr lang="es-ES"/>
           </a:p>
@@ -458,7 +459,7 @@
           <a:p>
             <a:fld id="{D06B42BD-9ADD-40B8-BE31-81CCC25D0212}" type="datetimeFigureOut">
               <a:rPr lang="es-ES" smtClean="0"/>
-              <a:t>30/12/2021</a:t>
+              <a:t>09/01/2022</a:t>
             </a:fld>
             <a:endParaRPr lang="es-ES"/>
           </a:p>
@@ -666,7 +667,7 @@
           <a:p>
             <a:fld id="{D06B42BD-9ADD-40B8-BE31-81CCC25D0212}" type="datetimeFigureOut">
               <a:rPr lang="es-ES" smtClean="0"/>
-              <a:t>30/12/2021</a:t>
+              <a:t>09/01/2022</a:t>
             </a:fld>
             <a:endParaRPr lang="es-ES"/>
           </a:p>
@@ -864,7 +865,7 @@
           <a:p>
             <a:fld id="{D06B42BD-9ADD-40B8-BE31-81CCC25D0212}" type="datetimeFigureOut">
               <a:rPr lang="es-ES" smtClean="0"/>
-              <a:t>30/12/2021</a:t>
+              <a:t>09/01/2022</a:t>
             </a:fld>
             <a:endParaRPr lang="es-ES"/>
           </a:p>
@@ -1139,7 +1140,7 @@
           <a:p>
             <a:fld id="{D06B42BD-9ADD-40B8-BE31-81CCC25D0212}" type="datetimeFigureOut">
               <a:rPr lang="es-ES" smtClean="0"/>
-              <a:t>30/12/2021</a:t>
+              <a:t>09/01/2022</a:t>
             </a:fld>
             <a:endParaRPr lang="es-ES"/>
           </a:p>
@@ -1404,7 +1405,7 @@
           <a:p>
             <a:fld id="{D06B42BD-9ADD-40B8-BE31-81CCC25D0212}" type="datetimeFigureOut">
               <a:rPr lang="es-ES" smtClean="0"/>
-              <a:t>30/12/2021</a:t>
+              <a:t>09/01/2022</a:t>
             </a:fld>
             <a:endParaRPr lang="es-ES"/>
           </a:p>
@@ -1816,7 +1817,7 @@
           <a:p>
             <a:fld id="{D06B42BD-9ADD-40B8-BE31-81CCC25D0212}" type="datetimeFigureOut">
               <a:rPr lang="es-ES" smtClean="0"/>
-              <a:t>30/12/2021</a:t>
+              <a:t>09/01/2022</a:t>
             </a:fld>
             <a:endParaRPr lang="es-ES"/>
           </a:p>
@@ -1957,7 +1958,7 @@
           <a:p>
             <a:fld id="{D06B42BD-9ADD-40B8-BE31-81CCC25D0212}" type="datetimeFigureOut">
               <a:rPr lang="es-ES" smtClean="0"/>
-              <a:t>30/12/2021</a:t>
+              <a:t>09/01/2022</a:t>
             </a:fld>
             <a:endParaRPr lang="es-ES"/>
           </a:p>
@@ -2070,7 +2071,7 @@
           <a:p>
             <a:fld id="{D06B42BD-9ADD-40B8-BE31-81CCC25D0212}" type="datetimeFigureOut">
               <a:rPr lang="es-ES" smtClean="0"/>
-              <a:t>30/12/2021</a:t>
+              <a:t>09/01/2022</a:t>
             </a:fld>
             <a:endParaRPr lang="es-ES"/>
           </a:p>
@@ -2381,7 +2382,7 @@
           <a:p>
             <a:fld id="{D06B42BD-9ADD-40B8-BE31-81CCC25D0212}" type="datetimeFigureOut">
               <a:rPr lang="es-ES" smtClean="0"/>
-              <a:t>30/12/2021</a:t>
+              <a:t>09/01/2022</a:t>
             </a:fld>
             <a:endParaRPr lang="es-ES"/>
           </a:p>
@@ -2669,7 +2670,7 @@
           <a:p>
             <a:fld id="{D06B42BD-9ADD-40B8-BE31-81CCC25D0212}" type="datetimeFigureOut">
               <a:rPr lang="es-ES" smtClean="0"/>
-              <a:t>30/12/2021</a:t>
+              <a:t>09/01/2022</a:t>
             </a:fld>
             <a:endParaRPr lang="es-ES"/>
           </a:p>
@@ -2910,7 +2911,7 @@
           <a:p>
             <a:fld id="{D06B42BD-9ADD-40B8-BE31-81CCC25D0212}" type="datetimeFigureOut">
               <a:rPr lang="es-ES" smtClean="0"/>
-              <a:t>30/12/2021</a:t>
+              <a:t>09/01/2022</a:t>
             </a:fld>
             <a:endParaRPr lang="es-ES"/>
           </a:p>
@@ -10736,6 +10737,2401 @@
 </p:sld>
 </file>
 
+<file path=ppt/slides/slide3.xml><?xml version="1.0" encoding="utf-8"?>
+<p:sld xmlns:a="http://schemas.openxmlformats.org/drawingml/2006/main" xmlns:r="http://schemas.openxmlformats.org/officeDocument/2006/relationships" xmlns:p="http://schemas.openxmlformats.org/presentationml/2006/main">
+  <p:cSld>
+    <p:spTree>
+      <p:nvGrpSpPr>
+        <p:cNvPr id="1" name=""/>
+        <p:cNvGrpSpPr/>
+        <p:nvPr/>
+      </p:nvGrpSpPr>
+      <p:grpSpPr>
+        <a:xfrm>
+          <a:off x="0" y="0"/>
+          <a:ext cx="0" cy="0"/>
+          <a:chOff x="0" y="0"/>
+          <a:chExt cx="0" cy="0"/>
+        </a:xfrm>
+      </p:grpSpPr>
+      <p:sp>
+        <p:nvSpPr>
+          <p:cNvPr id="4" name="Rectángulo 3">
+            <a:extLst>
+              <a:ext uri="{FF2B5EF4-FFF2-40B4-BE49-F238E27FC236}">
+                <a16:creationId xmlns:a16="http://schemas.microsoft.com/office/drawing/2014/main" id="{A00C9757-78F5-40F9-BFBD-EBC7C2130731}"/>
+              </a:ext>
+            </a:extLst>
+          </p:cNvPr>
+          <p:cNvSpPr/>
+          <p:nvPr/>
+        </p:nvSpPr>
+        <p:spPr>
+          <a:xfrm>
+            <a:off x="1605064" y="1708150"/>
+            <a:ext cx="1167319" cy="4324346"/>
+          </a:xfrm>
+          <a:prstGeom prst="rect">
+            <a:avLst/>
+          </a:prstGeom>
+          <a:noFill/>
+          <a:ln w="22225">
+            <a:solidFill>
+              <a:schemeClr val="tx1"/>
+            </a:solidFill>
+          </a:ln>
+        </p:spPr>
+        <p:style>
+          <a:lnRef idx="2">
+            <a:schemeClr val="accent1">
+              <a:shade val="50000"/>
+            </a:schemeClr>
+          </a:lnRef>
+          <a:fillRef idx="1">
+            <a:schemeClr val="accent1"/>
+          </a:fillRef>
+          <a:effectRef idx="0">
+            <a:schemeClr val="accent1"/>
+          </a:effectRef>
+          <a:fontRef idx="minor">
+            <a:schemeClr val="lt1"/>
+          </a:fontRef>
+        </p:style>
+        <p:txBody>
+          <a:bodyPr rtlCol="0" anchor="ctr"/>
+          <a:lstStyle/>
+          <a:p>
+            <a:pPr algn="ctr"/>
+            <a:endParaRPr lang="es-ES"/>
+          </a:p>
+        </p:txBody>
+      </p:sp>
+      <p:grpSp>
+        <p:nvGrpSpPr>
+          <p:cNvPr id="10" name="Grupo 9">
+            <a:extLst>
+              <a:ext uri="{FF2B5EF4-FFF2-40B4-BE49-F238E27FC236}">
+                <a16:creationId xmlns:a16="http://schemas.microsoft.com/office/drawing/2014/main" id="{1085A481-F0A8-4FF8-9896-2E4589F8A86B}"/>
+              </a:ext>
+            </a:extLst>
+          </p:cNvPr>
+          <p:cNvGrpSpPr/>
+          <p:nvPr/>
+        </p:nvGrpSpPr>
+        <p:grpSpPr>
+          <a:xfrm>
+            <a:off x="3447985" y="2250487"/>
+            <a:ext cx="598386" cy="400769"/>
+            <a:chOff x="4367314" y="1561695"/>
+            <a:chExt cx="680936" cy="432205"/>
+          </a:xfrm>
+        </p:grpSpPr>
+        <p:sp>
+          <p:nvSpPr>
+            <p:cNvPr id="5" name="Rectángulo 4">
+              <a:extLst>
+                <a:ext uri="{FF2B5EF4-FFF2-40B4-BE49-F238E27FC236}">
+                  <a16:creationId xmlns:a16="http://schemas.microsoft.com/office/drawing/2014/main" id="{912012E8-3F42-4E26-BDAC-112E9CC5DF09}"/>
+                </a:ext>
+              </a:extLst>
+            </p:cNvPr>
+            <p:cNvSpPr/>
+            <p:nvPr/>
+          </p:nvSpPr>
+          <p:spPr>
+            <a:xfrm>
+              <a:off x="4367315" y="1561695"/>
+              <a:ext cx="680935" cy="432205"/>
+            </a:xfrm>
+            <a:prstGeom prst="rect">
+              <a:avLst/>
+            </a:prstGeom>
+            <a:noFill/>
+            <a:ln w="22225">
+              <a:solidFill>
+                <a:schemeClr val="tx1"/>
+              </a:solidFill>
+            </a:ln>
+          </p:spPr>
+          <p:style>
+            <a:lnRef idx="2">
+              <a:schemeClr val="accent1">
+                <a:shade val="50000"/>
+              </a:schemeClr>
+            </a:lnRef>
+            <a:fillRef idx="1">
+              <a:schemeClr val="accent1"/>
+            </a:fillRef>
+            <a:effectRef idx="0">
+              <a:schemeClr val="accent1"/>
+            </a:effectRef>
+            <a:fontRef idx="minor">
+              <a:schemeClr val="lt1"/>
+            </a:fontRef>
+          </p:style>
+          <p:txBody>
+            <a:bodyPr rtlCol="0" anchor="ctr"/>
+            <a:lstStyle/>
+            <a:p>
+              <a:pPr algn="ctr"/>
+              <a:endParaRPr lang="es-ES"/>
+            </a:p>
+          </p:txBody>
+        </p:sp>
+        <p:sp>
+          <p:nvSpPr>
+            <p:cNvPr id="9" name="CuadroTexto 8">
+              <a:extLst>
+                <a:ext uri="{FF2B5EF4-FFF2-40B4-BE49-F238E27FC236}">
+                  <a16:creationId xmlns:a16="http://schemas.microsoft.com/office/drawing/2014/main" id="{6849F4F8-AFC7-4419-B096-926F77BB864A}"/>
+                </a:ext>
+              </a:extLst>
+            </p:cNvPr>
+            <p:cNvSpPr txBox="1"/>
+            <p:nvPr/>
+          </p:nvSpPr>
+          <p:spPr>
+            <a:xfrm>
+              <a:off x="4367314" y="1582578"/>
+              <a:ext cx="615810" cy="369332"/>
+            </a:xfrm>
+            <a:prstGeom prst="rect">
+              <a:avLst/>
+            </a:prstGeom>
+            <a:noFill/>
+          </p:spPr>
+          <p:txBody>
+            <a:bodyPr wrap="none" rtlCol="0">
+              <a:spAutoFit/>
+            </a:bodyPr>
+            <a:lstStyle/>
+            <a:p>
+              <a:r>
+                <a:rPr lang="es-ES" dirty="0"/>
+                <a:t>LFSR</a:t>
+              </a:r>
+            </a:p>
+          </p:txBody>
+        </p:sp>
+      </p:grpSp>
+      <p:grpSp>
+        <p:nvGrpSpPr>
+          <p:cNvPr id="11" name="Grupo 10">
+            <a:extLst>
+              <a:ext uri="{FF2B5EF4-FFF2-40B4-BE49-F238E27FC236}">
+                <a16:creationId xmlns:a16="http://schemas.microsoft.com/office/drawing/2014/main" id="{1F9B4815-4F6F-4730-8175-0D4A368EE438}"/>
+              </a:ext>
+            </a:extLst>
+          </p:cNvPr>
+          <p:cNvGrpSpPr/>
+          <p:nvPr/>
+        </p:nvGrpSpPr>
+        <p:grpSpPr>
+          <a:xfrm>
+            <a:off x="3412364" y="2952005"/>
+            <a:ext cx="734967" cy="400769"/>
+            <a:chOff x="4313282" y="1561695"/>
+            <a:chExt cx="788999" cy="432205"/>
+          </a:xfrm>
+        </p:grpSpPr>
+        <p:sp>
+          <p:nvSpPr>
+            <p:cNvPr id="12" name="Rectángulo 11">
+              <a:extLst>
+                <a:ext uri="{FF2B5EF4-FFF2-40B4-BE49-F238E27FC236}">
+                  <a16:creationId xmlns:a16="http://schemas.microsoft.com/office/drawing/2014/main" id="{4E9B1E3F-0194-4C00-AD7F-BF39FC3843C2}"/>
+                </a:ext>
+              </a:extLst>
+            </p:cNvPr>
+            <p:cNvSpPr/>
+            <p:nvPr/>
+          </p:nvSpPr>
+          <p:spPr>
+            <a:xfrm>
+              <a:off x="4367315" y="1561695"/>
+              <a:ext cx="680935" cy="432205"/>
+            </a:xfrm>
+            <a:prstGeom prst="rect">
+              <a:avLst/>
+            </a:prstGeom>
+            <a:noFill/>
+            <a:ln w="22225">
+              <a:solidFill>
+                <a:schemeClr val="tx1"/>
+              </a:solidFill>
+            </a:ln>
+          </p:spPr>
+          <p:style>
+            <a:lnRef idx="2">
+              <a:schemeClr val="accent1">
+                <a:shade val="50000"/>
+              </a:schemeClr>
+            </a:lnRef>
+            <a:fillRef idx="1">
+              <a:schemeClr val="accent1"/>
+            </a:fillRef>
+            <a:effectRef idx="0">
+              <a:schemeClr val="accent1"/>
+            </a:effectRef>
+            <a:fontRef idx="minor">
+              <a:schemeClr val="lt1"/>
+            </a:fontRef>
+          </p:style>
+          <p:txBody>
+            <a:bodyPr rtlCol="0" anchor="ctr"/>
+            <a:lstStyle/>
+            <a:p>
+              <a:pPr algn="ctr"/>
+              <a:endParaRPr lang="es-ES"/>
+            </a:p>
+          </p:txBody>
+        </p:sp>
+        <p:sp>
+          <p:nvSpPr>
+            <p:cNvPr id="13" name="CuadroTexto 12">
+              <a:extLst>
+                <a:ext uri="{FF2B5EF4-FFF2-40B4-BE49-F238E27FC236}">
+                  <a16:creationId xmlns:a16="http://schemas.microsoft.com/office/drawing/2014/main" id="{50A16508-CEEC-4353-956B-9CA6B31560EA}"/>
+                </a:ext>
+              </a:extLst>
+            </p:cNvPr>
+            <p:cNvSpPr txBox="1"/>
+            <p:nvPr/>
+          </p:nvSpPr>
+          <p:spPr>
+            <a:xfrm>
+              <a:off x="4313282" y="1593130"/>
+              <a:ext cx="788999" cy="369332"/>
+            </a:xfrm>
+            <a:prstGeom prst="rect">
+              <a:avLst/>
+            </a:prstGeom>
+            <a:noFill/>
+          </p:spPr>
+          <p:txBody>
+            <a:bodyPr wrap="none" rtlCol="0">
+              <a:spAutoFit/>
+            </a:bodyPr>
+            <a:lstStyle/>
+            <a:p>
+              <a:r>
+                <a:rPr lang="es-ES" sz="1600" dirty="0"/>
+                <a:t>TIMER</a:t>
+              </a:r>
+            </a:p>
+          </p:txBody>
+        </p:sp>
+      </p:grpSp>
+      <p:grpSp>
+        <p:nvGrpSpPr>
+          <p:cNvPr id="16" name="Grupo 15">
+            <a:extLst>
+              <a:ext uri="{FF2B5EF4-FFF2-40B4-BE49-F238E27FC236}">
+                <a16:creationId xmlns:a16="http://schemas.microsoft.com/office/drawing/2014/main" id="{644D7FD5-1622-4914-A92D-C7CD6EA1943D}"/>
+              </a:ext>
+            </a:extLst>
+          </p:cNvPr>
+          <p:cNvGrpSpPr/>
+          <p:nvPr/>
+        </p:nvGrpSpPr>
+        <p:grpSpPr>
+          <a:xfrm>
+            <a:off x="4798033" y="3995721"/>
+            <a:ext cx="734967" cy="400769"/>
+            <a:chOff x="4313282" y="1561695"/>
+            <a:chExt cx="788999" cy="432205"/>
+          </a:xfrm>
+        </p:grpSpPr>
+        <p:sp>
+          <p:nvSpPr>
+            <p:cNvPr id="17" name="Rectángulo 16">
+              <a:extLst>
+                <a:ext uri="{FF2B5EF4-FFF2-40B4-BE49-F238E27FC236}">
+                  <a16:creationId xmlns:a16="http://schemas.microsoft.com/office/drawing/2014/main" id="{2E5C44E3-7870-4614-88C7-7400F4DF5CE5}"/>
+                </a:ext>
+              </a:extLst>
+            </p:cNvPr>
+            <p:cNvSpPr/>
+            <p:nvPr/>
+          </p:nvSpPr>
+          <p:spPr>
+            <a:xfrm>
+              <a:off x="4367315" y="1561695"/>
+              <a:ext cx="680935" cy="432205"/>
+            </a:xfrm>
+            <a:prstGeom prst="rect">
+              <a:avLst/>
+            </a:prstGeom>
+            <a:noFill/>
+            <a:ln w="22225">
+              <a:solidFill>
+                <a:schemeClr val="tx1"/>
+              </a:solidFill>
+            </a:ln>
+          </p:spPr>
+          <p:style>
+            <a:lnRef idx="2">
+              <a:schemeClr val="accent1">
+                <a:shade val="50000"/>
+              </a:schemeClr>
+            </a:lnRef>
+            <a:fillRef idx="1">
+              <a:schemeClr val="accent1"/>
+            </a:fillRef>
+            <a:effectRef idx="0">
+              <a:schemeClr val="accent1"/>
+            </a:effectRef>
+            <a:fontRef idx="minor">
+              <a:schemeClr val="lt1"/>
+            </a:fontRef>
+          </p:style>
+          <p:txBody>
+            <a:bodyPr rtlCol="0" anchor="ctr"/>
+            <a:lstStyle/>
+            <a:p>
+              <a:pPr algn="ctr"/>
+              <a:endParaRPr lang="es-ES"/>
+            </a:p>
+          </p:txBody>
+        </p:sp>
+        <p:sp>
+          <p:nvSpPr>
+            <p:cNvPr id="18" name="CuadroTexto 17">
+              <a:extLst>
+                <a:ext uri="{FF2B5EF4-FFF2-40B4-BE49-F238E27FC236}">
+                  <a16:creationId xmlns:a16="http://schemas.microsoft.com/office/drawing/2014/main" id="{3BE74581-233E-40CC-8339-51DE71211AF0}"/>
+                </a:ext>
+              </a:extLst>
+            </p:cNvPr>
+            <p:cNvSpPr txBox="1"/>
+            <p:nvPr/>
+          </p:nvSpPr>
+          <p:spPr>
+            <a:xfrm>
+              <a:off x="4313282" y="1593130"/>
+              <a:ext cx="788999" cy="369332"/>
+            </a:xfrm>
+            <a:prstGeom prst="rect">
+              <a:avLst/>
+            </a:prstGeom>
+            <a:noFill/>
+          </p:spPr>
+          <p:txBody>
+            <a:bodyPr wrap="none" rtlCol="0">
+              <a:spAutoFit/>
+            </a:bodyPr>
+            <a:lstStyle/>
+            <a:p>
+              <a:r>
+                <a:rPr lang="es-ES" sz="1600" dirty="0"/>
+                <a:t>TIMER</a:t>
+              </a:r>
+            </a:p>
+          </p:txBody>
+        </p:sp>
+      </p:grpSp>
+      <p:grpSp>
+        <p:nvGrpSpPr>
+          <p:cNvPr id="21" name="Grupo 20">
+            <a:extLst>
+              <a:ext uri="{FF2B5EF4-FFF2-40B4-BE49-F238E27FC236}">
+                <a16:creationId xmlns:a16="http://schemas.microsoft.com/office/drawing/2014/main" id="{0622AF59-1D3F-4244-9882-8E5BA5B4A1D3}"/>
+              </a:ext>
+            </a:extLst>
+          </p:cNvPr>
+          <p:cNvGrpSpPr/>
+          <p:nvPr/>
+        </p:nvGrpSpPr>
+        <p:grpSpPr>
+          <a:xfrm>
+            <a:off x="3756532" y="4781054"/>
+            <a:ext cx="680936" cy="1251445"/>
+            <a:chOff x="3647336" y="4200323"/>
+            <a:chExt cx="680936" cy="771728"/>
+          </a:xfrm>
+        </p:grpSpPr>
+        <p:sp>
+          <p:nvSpPr>
+            <p:cNvPr id="15" name="Rectángulo 14">
+              <a:extLst>
+                <a:ext uri="{FF2B5EF4-FFF2-40B4-BE49-F238E27FC236}">
+                  <a16:creationId xmlns:a16="http://schemas.microsoft.com/office/drawing/2014/main" id="{6619A025-006A-4DE5-A63C-3648613DA464}"/>
+                </a:ext>
+              </a:extLst>
+            </p:cNvPr>
+            <p:cNvSpPr/>
+            <p:nvPr/>
+          </p:nvSpPr>
+          <p:spPr>
+            <a:xfrm>
+              <a:off x="3647336" y="4200323"/>
+              <a:ext cx="680936" cy="771728"/>
+            </a:xfrm>
+            <a:prstGeom prst="rect">
+              <a:avLst/>
+            </a:prstGeom>
+            <a:noFill/>
+            <a:ln w="22225">
+              <a:solidFill>
+                <a:schemeClr val="tx1"/>
+              </a:solidFill>
+            </a:ln>
+          </p:spPr>
+          <p:style>
+            <a:lnRef idx="2">
+              <a:schemeClr val="accent1">
+                <a:shade val="50000"/>
+              </a:schemeClr>
+            </a:lnRef>
+            <a:fillRef idx="1">
+              <a:schemeClr val="accent1"/>
+            </a:fillRef>
+            <a:effectRef idx="0">
+              <a:schemeClr val="accent1"/>
+            </a:effectRef>
+            <a:fontRef idx="minor">
+              <a:schemeClr val="lt1"/>
+            </a:fontRef>
+          </p:style>
+          <p:txBody>
+            <a:bodyPr rtlCol="0" anchor="ctr"/>
+            <a:lstStyle/>
+            <a:p>
+              <a:pPr algn="ctr"/>
+              <a:endParaRPr lang="es-ES"/>
+            </a:p>
+          </p:txBody>
+        </p:sp>
+        <p:sp>
+          <p:nvSpPr>
+            <p:cNvPr id="20" name="CuadroTexto 19">
+              <a:extLst>
+                <a:ext uri="{FF2B5EF4-FFF2-40B4-BE49-F238E27FC236}">
+                  <a16:creationId xmlns:a16="http://schemas.microsoft.com/office/drawing/2014/main" id="{B38987A8-B1FD-41B7-B6B3-D5E4272BC29F}"/>
+                </a:ext>
+              </a:extLst>
+            </p:cNvPr>
+            <p:cNvSpPr txBox="1"/>
+            <p:nvPr/>
+          </p:nvSpPr>
+          <p:spPr>
+            <a:xfrm>
+              <a:off x="3662234" y="4465948"/>
+              <a:ext cx="651140" cy="246221"/>
+            </a:xfrm>
+            <a:prstGeom prst="rect">
+              <a:avLst/>
+            </a:prstGeom>
+            <a:noFill/>
+          </p:spPr>
+          <p:txBody>
+            <a:bodyPr wrap="none" rtlCol="0">
+              <a:spAutoFit/>
+            </a:bodyPr>
+            <a:lstStyle/>
+            <a:p>
+              <a:r>
+                <a:rPr lang="es-ES" sz="1000" b="1" dirty="0"/>
+                <a:t>INCHECK</a:t>
+              </a:r>
+            </a:p>
+          </p:txBody>
+        </p:sp>
+      </p:grpSp>
+      <p:grpSp>
+        <p:nvGrpSpPr>
+          <p:cNvPr id="22" name="Grupo 21">
+            <a:extLst>
+              <a:ext uri="{FF2B5EF4-FFF2-40B4-BE49-F238E27FC236}">
+                <a16:creationId xmlns:a16="http://schemas.microsoft.com/office/drawing/2014/main" id="{0BEF1A58-E9AC-48B3-BBA5-689FA214A57A}"/>
+              </a:ext>
+            </a:extLst>
+          </p:cNvPr>
+          <p:cNvGrpSpPr/>
+          <p:nvPr/>
+        </p:nvGrpSpPr>
+        <p:grpSpPr>
+          <a:xfrm>
+            <a:off x="3451282" y="3685018"/>
+            <a:ext cx="740908" cy="771728"/>
+            <a:chOff x="3620320" y="4200323"/>
+            <a:chExt cx="740908" cy="771728"/>
+          </a:xfrm>
+        </p:grpSpPr>
+        <p:sp>
+          <p:nvSpPr>
+            <p:cNvPr id="23" name="Rectángulo 22">
+              <a:extLst>
+                <a:ext uri="{FF2B5EF4-FFF2-40B4-BE49-F238E27FC236}">
+                  <a16:creationId xmlns:a16="http://schemas.microsoft.com/office/drawing/2014/main" id="{62CD0C1D-2480-4C6D-A4F4-CF005BCB524D}"/>
+                </a:ext>
+              </a:extLst>
+            </p:cNvPr>
+            <p:cNvSpPr/>
+            <p:nvPr/>
+          </p:nvSpPr>
+          <p:spPr>
+            <a:xfrm>
+              <a:off x="3647336" y="4200323"/>
+              <a:ext cx="680936" cy="771728"/>
+            </a:xfrm>
+            <a:prstGeom prst="rect">
+              <a:avLst/>
+            </a:prstGeom>
+            <a:noFill/>
+            <a:ln w="22225">
+              <a:solidFill>
+                <a:schemeClr val="tx1"/>
+              </a:solidFill>
+            </a:ln>
+          </p:spPr>
+          <p:style>
+            <a:lnRef idx="2">
+              <a:schemeClr val="accent1">
+                <a:shade val="50000"/>
+              </a:schemeClr>
+            </a:lnRef>
+            <a:fillRef idx="1">
+              <a:schemeClr val="accent1"/>
+            </a:fillRef>
+            <a:effectRef idx="0">
+              <a:schemeClr val="accent1"/>
+            </a:effectRef>
+            <a:fontRef idx="minor">
+              <a:schemeClr val="lt1"/>
+            </a:fontRef>
+          </p:style>
+          <p:txBody>
+            <a:bodyPr rtlCol="0" anchor="ctr"/>
+            <a:lstStyle/>
+            <a:p>
+              <a:pPr algn="ctr"/>
+              <a:endParaRPr lang="es-ES"/>
+            </a:p>
+          </p:txBody>
+        </p:sp>
+        <p:sp>
+          <p:nvSpPr>
+            <p:cNvPr id="24" name="CuadroTexto 23">
+              <a:extLst>
+                <a:ext uri="{FF2B5EF4-FFF2-40B4-BE49-F238E27FC236}">
+                  <a16:creationId xmlns:a16="http://schemas.microsoft.com/office/drawing/2014/main" id="{8492D1D5-0653-463C-9A27-6139B721F82F}"/>
+                </a:ext>
+              </a:extLst>
+            </p:cNvPr>
+            <p:cNvSpPr txBox="1"/>
+            <p:nvPr/>
+          </p:nvSpPr>
+          <p:spPr>
+            <a:xfrm>
+              <a:off x="3620320" y="4463076"/>
+              <a:ext cx="740908" cy="246221"/>
+            </a:xfrm>
+            <a:prstGeom prst="rect">
+              <a:avLst/>
+            </a:prstGeom>
+            <a:noFill/>
+          </p:spPr>
+          <p:txBody>
+            <a:bodyPr wrap="none" rtlCol="0">
+              <a:spAutoFit/>
+            </a:bodyPr>
+            <a:lstStyle/>
+            <a:p>
+              <a:r>
+                <a:rPr lang="es-ES" sz="1000" b="1" dirty="0"/>
+                <a:t>SHOWSEQ</a:t>
+              </a:r>
+            </a:p>
+          </p:txBody>
+        </p:sp>
+      </p:grpSp>
+      <p:sp>
+        <p:nvSpPr>
+          <p:cNvPr id="25" name="CuadroTexto 24">
+            <a:extLst>
+              <a:ext uri="{FF2B5EF4-FFF2-40B4-BE49-F238E27FC236}">
+                <a16:creationId xmlns:a16="http://schemas.microsoft.com/office/drawing/2014/main" id="{406CC8BF-5843-40E7-81F1-657DAB37E42E}"/>
+              </a:ext>
+            </a:extLst>
+          </p:cNvPr>
+          <p:cNvSpPr txBox="1"/>
+          <p:nvPr/>
+        </p:nvSpPr>
+        <p:spPr>
+          <a:xfrm>
+            <a:off x="1696892" y="3593290"/>
+            <a:ext cx="968535" cy="369332"/>
+          </a:xfrm>
+          <a:prstGeom prst="rect">
+            <a:avLst/>
+          </a:prstGeom>
+          <a:noFill/>
+        </p:spPr>
+        <p:txBody>
+          <a:bodyPr wrap="none" rtlCol="0">
+            <a:spAutoFit/>
+          </a:bodyPr>
+          <a:lstStyle/>
+          <a:p>
+            <a:r>
+              <a:rPr lang="es-ES" dirty="0"/>
+              <a:t>MASTER</a:t>
+            </a:r>
+          </a:p>
+        </p:txBody>
+      </p:sp>
+      <p:cxnSp>
+        <p:nvCxnSpPr>
+          <p:cNvPr id="27" name="Conector recto de flecha 26">
+            <a:extLst>
+              <a:ext uri="{FF2B5EF4-FFF2-40B4-BE49-F238E27FC236}">
+                <a16:creationId xmlns:a16="http://schemas.microsoft.com/office/drawing/2014/main" id="{BA91F16B-022D-486D-AC40-F314F5AC085C}"/>
+              </a:ext>
+            </a:extLst>
+          </p:cNvPr>
+          <p:cNvCxnSpPr>
+            <a:cxnSpLocks/>
+          </p:cNvCxnSpPr>
+          <p:nvPr/>
+        </p:nvCxnSpPr>
+        <p:spPr>
+          <a:xfrm flipH="1">
+            <a:off x="2763906" y="2307644"/>
+            <a:ext cx="684078" cy="1"/>
+          </a:xfrm>
+          <a:prstGeom prst="straightConnector1">
+            <a:avLst/>
+          </a:prstGeom>
+          <a:ln w="12700">
+            <a:solidFill>
+              <a:schemeClr val="tx1"/>
+            </a:solidFill>
+            <a:tailEnd type="triangle"/>
+          </a:ln>
+        </p:spPr>
+        <p:style>
+          <a:lnRef idx="1">
+            <a:schemeClr val="accent1"/>
+          </a:lnRef>
+          <a:fillRef idx="0">
+            <a:schemeClr val="accent1"/>
+          </a:fillRef>
+          <a:effectRef idx="0">
+            <a:schemeClr val="accent1"/>
+          </a:effectRef>
+          <a:fontRef idx="minor">
+            <a:schemeClr val="tx1"/>
+          </a:fontRef>
+        </p:style>
+      </p:cxnSp>
+      <p:cxnSp>
+        <p:nvCxnSpPr>
+          <p:cNvPr id="32" name="Conector recto de flecha 31">
+            <a:extLst>
+              <a:ext uri="{FF2B5EF4-FFF2-40B4-BE49-F238E27FC236}">
+                <a16:creationId xmlns:a16="http://schemas.microsoft.com/office/drawing/2014/main" id="{5AFAA3EF-BDA9-4F26-8ADF-91893D79F519}"/>
+              </a:ext>
+            </a:extLst>
+          </p:cNvPr>
+          <p:cNvCxnSpPr>
+            <a:cxnSpLocks/>
+          </p:cNvCxnSpPr>
+          <p:nvPr/>
+        </p:nvCxnSpPr>
+        <p:spPr>
+          <a:xfrm flipH="1">
+            <a:off x="2772383" y="2599179"/>
+            <a:ext cx="675602" cy="0"/>
+          </a:xfrm>
+          <a:prstGeom prst="straightConnector1">
+            <a:avLst/>
+          </a:prstGeom>
+          <a:ln w="12700">
+            <a:solidFill>
+              <a:schemeClr val="tx1"/>
+            </a:solidFill>
+            <a:tailEnd type="triangle"/>
+          </a:ln>
+        </p:spPr>
+        <p:style>
+          <a:lnRef idx="1">
+            <a:schemeClr val="accent1"/>
+          </a:lnRef>
+          <a:fillRef idx="0">
+            <a:schemeClr val="accent1"/>
+          </a:fillRef>
+          <a:effectRef idx="0">
+            <a:schemeClr val="accent1"/>
+          </a:effectRef>
+          <a:fontRef idx="minor">
+            <a:schemeClr val="tx1"/>
+          </a:fontRef>
+        </p:style>
+      </p:cxnSp>
+      <p:cxnSp>
+        <p:nvCxnSpPr>
+          <p:cNvPr id="37" name="Conector recto de flecha 36">
+            <a:extLst>
+              <a:ext uri="{FF2B5EF4-FFF2-40B4-BE49-F238E27FC236}">
+                <a16:creationId xmlns:a16="http://schemas.microsoft.com/office/drawing/2014/main" id="{B5B2D170-D301-415B-91D1-A2DF46EC213C}"/>
+              </a:ext>
+            </a:extLst>
+          </p:cNvPr>
+          <p:cNvCxnSpPr>
+            <a:cxnSpLocks/>
+          </p:cNvCxnSpPr>
+          <p:nvPr/>
+        </p:nvCxnSpPr>
+        <p:spPr>
+          <a:xfrm>
+            <a:off x="2779739" y="3033110"/>
+            <a:ext cx="668246" cy="0"/>
+          </a:xfrm>
+          <a:prstGeom prst="straightConnector1">
+            <a:avLst/>
+          </a:prstGeom>
+          <a:ln w="12700">
+            <a:solidFill>
+              <a:schemeClr val="tx1"/>
+            </a:solidFill>
+            <a:tailEnd type="triangle"/>
+          </a:ln>
+        </p:spPr>
+        <p:style>
+          <a:lnRef idx="1">
+            <a:schemeClr val="accent1"/>
+          </a:lnRef>
+          <a:fillRef idx="0">
+            <a:schemeClr val="accent1"/>
+          </a:fillRef>
+          <a:effectRef idx="0">
+            <a:schemeClr val="accent1"/>
+          </a:effectRef>
+          <a:fontRef idx="minor">
+            <a:schemeClr val="tx1"/>
+          </a:fontRef>
+        </p:style>
+      </p:cxnSp>
+      <p:cxnSp>
+        <p:nvCxnSpPr>
+          <p:cNvPr id="38" name="Conector recto de flecha 37">
+            <a:extLst>
+              <a:ext uri="{FF2B5EF4-FFF2-40B4-BE49-F238E27FC236}">
+                <a16:creationId xmlns:a16="http://schemas.microsoft.com/office/drawing/2014/main" id="{F4BF7AD1-0B29-4ABE-ABC4-69EF77556658}"/>
+              </a:ext>
+            </a:extLst>
+          </p:cNvPr>
+          <p:cNvCxnSpPr>
+            <a:cxnSpLocks/>
+          </p:cNvCxnSpPr>
+          <p:nvPr/>
+        </p:nvCxnSpPr>
+        <p:spPr>
+          <a:xfrm flipH="1">
+            <a:off x="2772383" y="3317714"/>
+            <a:ext cx="675602" cy="0"/>
+          </a:xfrm>
+          <a:prstGeom prst="straightConnector1">
+            <a:avLst/>
+          </a:prstGeom>
+          <a:ln w="12700">
+            <a:solidFill>
+              <a:schemeClr val="tx1"/>
+            </a:solidFill>
+            <a:tailEnd type="triangle"/>
+          </a:ln>
+        </p:spPr>
+        <p:style>
+          <a:lnRef idx="1">
+            <a:schemeClr val="accent1"/>
+          </a:lnRef>
+          <a:fillRef idx="0">
+            <a:schemeClr val="accent1"/>
+          </a:fillRef>
+          <a:effectRef idx="0">
+            <a:schemeClr val="accent1"/>
+          </a:effectRef>
+          <a:fontRef idx="minor">
+            <a:schemeClr val="tx1"/>
+          </a:fontRef>
+        </p:style>
+      </p:cxnSp>
+      <p:cxnSp>
+        <p:nvCxnSpPr>
+          <p:cNvPr id="39" name="Conector recto de flecha 38">
+            <a:extLst>
+              <a:ext uri="{FF2B5EF4-FFF2-40B4-BE49-F238E27FC236}">
+                <a16:creationId xmlns:a16="http://schemas.microsoft.com/office/drawing/2014/main" id="{31EBEEBF-A707-41DF-AFD1-E4CDEC433F7A}"/>
+              </a:ext>
+            </a:extLst>
+          </p:cNvPr>
+          <p:cNvCxnSpPr>
+            <a:cxnSpLocks/>
+          </p:cNvCxnSpPr>
+          <p:nvPr/>
+        </p:nvCxnSpPr>
+        <p:spPr>
+          <a:xfrm>
+            <a:off x="2772383" y="1852613"/>
+            <a:ext cx="3301392" cy="0"/>
+          </a:xfrm>
+          <a:prstGeom prst="straightConnector1">
+            <a:avLst/>
+          </a:prstGeom>
+          <a:ln w="12700">
+            <a:solidFill>
+              <a:schemeClr val="tx1"/>
+            </a:solidFill>
+            <a:tailEnd type="triangle"/>
+          </a:ln>
+        </p:spPr>
+        <p:style>
+          <a:lnRef idx="1">
+            <a:schemeClr val="accent1"/>
+          </a:lnRef>
+          <a:fillRef idx="0">
+            <a:schemeClr val="accent1"/>
+          </a:fillRef>
+          <a:effectRef idx="0">
+            <a:schemeClr val="accent1"/>
+          </a:effectRef>
+          <a:fontRef idx="minor">
+            <a:schemeClr val="tx1"/>
+          </a:fontRef>
+        </p:style>
+      </p:cxnSp>
+      <p:cxnSp>
+        <p:nvCxnSpPr>
+          <p:cNvPr id="41" name="Conector recto de flecha 40">
+            <a:extLst>
+              <a:ext uri="{FF2B5EF4-FFF2-40B4-BE49-F238E27FC236}">
+                <a16:creationId xmlns:a16="http://schemas.microsoft.com/office/drawing/2014/main" id="{3ED95D8F-8D0E-43A5-B662-0EE692AB9B6F}"/>
+              </a:ext>
+            </a:extLst>
+          </p:cNvPr>
+          <p:cNvCxnSpPr>
+            <a:cxnSpLocks/>
+          </p:cNvCxnSpPr>
+          <p:nvPr/>
+        </p:nvCxnSpPr>
+        <p:spPr>
+          <a:xfrm>
+            <a:off x="4152900" y="3756660"/>
+            <a:ext cx="1943100" cy="0"/>
+          </a:xfrm>
+          <a:prstGeom prst="straightConnector1">
+            <a:avLst/>
+          </a:prstGeom>
+          <a:ln w="12700">
+            <a:solidFill>
+              <a:schemeClr val="tx1"/>
+            </a:solidFill>
+            <a:tailEnd type="triangle"/>
+          </a:ln>
+        </p:spPr>
+        <p:style>
+          <a:lnRef idx="1">
+            <a:schemeClr val="accent1"/>
+          </a:lnRef>
+          <a:fillRef idx="0">
+            <a:schemeClr val="accent1"/>
+          </a:fillRef>
+          <a:effectRef idx="0">
+            <a:schemeClr val="accent1"/>
+          </a:effectRef>
+          <a:fontRef idx="minor">
+            <a:schemeClr val="tx1"/>
+          </a:fontRef>
+        </p:style>
+      </p:cxnSp>
+      <p:cxnSp>
+        <p:nvCxnSpPr>
+          <p:cNvPr id="47" name="Conector recto de flecha 46">
+            <a:extLst>
+              <a:ext uri="{FF2B5EF4-FFF2-40B4-BE49-F238E27FC236}">
+                <a16:creationId xmlns:a16="http://schemas.microsoft.com/office/drawing/2014/main" id="{F6B62987-9B77-4CD2-BF9D-F5DD5EF44E3F}"/>
+              </a:ext>
+            </a:extLst>
+          </p:cNvPr>
+          <p:cNvCxnSpPr>
+            <a:cxnSpLocks/>
+          </p:cNvCxnSpPr>
+          <p:nvPr/>
+        </p:nvCxnSpPr>
+        <p:spPr>
+          <a:xfrm>
+            <a:off x="936818" y="1868488"/>
+            <a:ext cx="668246" cy="0"/>
+          </a:xfrm>
+          <a:prstGeom prst="straightConnector1">
+            <a:avLst/>
+          </a:prstGeom>
+          <a:ln w="12700">
+            <a:solidFill>
+              <a:schemeClr val="tx1"/>
+            </a:solidFill>
+            <a:tailEnd type="triangle"/>
+          </a:ln>
+        </p:spPr>
+        <p:style>
+          <a:lnRef idx="1">
+            <a:schemeClr val="accent1"/>
+          </a:lnRef>
+          <a:fillRef idx="0">
+            <a:schemeClr val="accent1"/>
+          </a:fillRef>
+          <a:effectRef idx="0">
+            <a:schemeClr val="accent1"/>
+          </a:effectRef>
+          <a:fontRef idx="minor">
+            <a:schemeClr val="tx1"/>
+          </a:fontRef>
+        </p:style>
+      </p:cxnSp>
+      <p:cxnSp>
+        <p:nvCxnSpPr>
+          <p:cNvPr id="48" name="Conector recto de flecha 47">
+            <a:extLst>
+              <a:ext uri="{FF2B5EF4-FFF2-40B4-BE49-F238E27FC236}">
+                <a16:creationId xmlns:a16="http://schemas.microsoft.com/office/drawing/2014/main" id="{1B2C45A9-921C-4A1E-87FD-14289BEC3AE4}"/>
+              </a:ext>
+            </a:extLst>
+          </p:cNvPr>
+          <p:cNvCxnSpPr>
+            <a:cxnSpLocks/>
+          </p:cNvCxnSpPr>
+          <p:nvPr/>
+        </p:nvCxnSpPr>
+        <p:spPr>
+          <a:xfrm>
+            <a:off x="936818" y="2128838"/>
+            <a:ext cx="668246" cy="0"/>
+          </a:xfrm>
+          <a:prstGeom prst="straightConnector1">
+            <a:avLst/>
+          </a:prstGeom>
+          <a:ln w="12700">
+            <a:solidFill>
+              <a:schemeClr val="tx1"/>
+            </a:solidFill>
+            <a:tailEnd type="triangle"/>
+          </a:ln>
+        </p:spPr>
+        <p:style>
+          <a:lnRef idx="1">
+            <a:schemeClr val="accent1"/>
+          </a:lnRef>
+          <a:fillRef idx="0">
+            <a:schemeClr val="accent1"/>
+          </a:fillRef>
+          <a:effectRef idx="0">
+            <a:schemeClr val="accent1"/>
+          </a:effectRef>
+          <a:fontRef idx="minor">
+            <a:schemeClr val="tx1"/>
+          </a:fontRef>
+        </p:style>
+      </p:cxnSp>
+      <p:cxnSp>
+        <p:nvCxnSpPr>
+          <p:cNvPr id="49" name="Conector recto de flecha 48">
+            <a:extLst>
+              <a:ext uri="{FF2B5EF4-FFF2-40B4-BE49-F238E27FC236}">
+                <a16:creationId xmlns:a16="http://schemas.microsoft.com/office/drawing/2014/main" id="{2D1ABC2A-A2E4-45C7-B01C-440E3FAECB7D}"/>
+              </a:ext>
+            </a:extLst>
+          </p:cNvPr>
+          <p:cNvCxnSpPr>
+            <a:cxnSpLocks/>
+          </p:cNvCxnSpPr>
+          <p:nvPr/>
+        </p:nvCxnSpPr>
+        <p:spPr>
+          <a:xfrm>
+            <a:off x="936818" y="2389188"/>
+            <a:ext cx="668246" cy="0"/>
+          </a:xfrm>
+          <a:prstGeom prst="straightConnector1">
+            <a:avLst/>
+          </a:prstGeom>
+          <a:ln w="12700">
+            <a:solidFill>
+              <a:schemeClr val="tx1"/>
+            </a:solidFill>
+            <a:tailEnd type="triangle"/>
+          </a:ln>
+        </p:spPr>
+        <p:style>
+          <a:lnRef idx="1">
+            <a:schemeClr val="accent1"/>
+          </a:lnRef>
+          <a:fillRef idx="0">
+            <a:schemeClr val="accent1"/>
+          </a:fillRef>
+          <a:effectRef idx="0">
+            <a:schemeClr val="accent1"/>
+          </a:effectRef>
+          <a:fontRef idx="minor">
+            <a:schemeClr val="tx1"/>
+          </a:fontRef>
+        </p:style>
+      </p:cxnSp>
+      <p:cxnSp>
+        <p:nvCxnSpPr>
+          <p:cNvPr id="50" name="Conector recto de flecha 49">
+            <a:extLst>
+              <a:ext uri="{FF2B5EF4-FFF2-40B4-BE49-F238E27FC236}">
+                <a16:creationId xmlns:a16="http://schemas.microsoft.com/office/drawing/2014/main" id="{88818E6B-A563-41E3-86D5-5946E7961161}"/>
+              </a:ext>
+            </a:extLst>
+          </p:cNvPr>
+          <p:cNvCxnSpPr>
+            <a:cxnSpLocks/>
+          </p:cNvCxnSpPr>
+          <p:nvPr/>
+        </p:nvCxnSpPr>
+        <p:spPr>
+          <a:xfrm>
+            <a:off x="3377034" y="4865194"/>
+            <a:ext cx="379498" cy="0"/>
+          </a:xfrm>
+          <a:prstGeom prst="straightConnector1">
+            <a:avLst/>
+          </a:prstGeom>
+          <a:ln w="12700">
+            <a:solidFill>
+              <a:schemeClr val="tx1"/>
+            </a:solidFill>
+            <a:tailEnd type="triangle"/>
+          </a:ln>
+        </p:spPr>
+        <p:style>
+          <a:lnRef idx="1">
+            <a:schemeClr val="accent1"/>
+          </a:lnRef>
+          <a:fillRef idx="0">
+            <a:schemeClr val="accent1"/>
+          </a:fillRef>
+          <a:effectRef idx="0">
+            <a:schemeClr val="accent1"/>
+          </a:effectRef>
+          <a:fontRef idx="minor">
+            <a:schemeClr val="tx1"/>
+          </a:fontRef>
+        </p:style>
+      </p:cxnSp>
+      <p:cxnSp>
+        <p:nvCxnSpPr>
+          <p:cNvPr id="52" name="Conector recto de flecha 51">
+            <a:extLst>
+              <a:ext uri="{FF2B5EF4-FFF2-40B4-BE49-F238E27FC236}">
+                <a16:creationId xmlns:a16="http://schemas.microsoft.com/office/drawing/2014/main" id="{3F587D4B-51C4-4D9D-A09C-6D9A3BF7678F}"/>
+              </a:ext>
+            </a:extLst>
+          </p:cNvPr>
+          <p:cNvCxnSpPr>
+            <a:cxnSpLocks/>
+          </p:cNvCxnSpPr>
+          <p:nvPr/>
+        </p:nvCxnSpPr>
+        <p:spPr>
+          <a:xfrm>
+            <a:off x="3377034" y="5025214"/>
+            <a:ext cx="379498" cy="0"/>
+          </a:xfrm>
+          <a:prstGeom prst="straightConnector1">
+            <a:avLst/>
+          </a:prstGeom>
+          <a:ln w="12700">
+            <a:solidFill>
+              <a:schemeClr val="tx1"/>
+            </a:solidFill>
+            <a:tailEnd type="triangle"/>
+          </a:ln>
+        </p:spPr>
+        <p:style>
+          <a:lnRef idx="1">
+            <a:schemeClr val="accent1"/>
+          </a:lnRef>
+          <a:fillRef idx="0">
+            <a:schemeClr val="accent1"/>
+          </a:fillRef>
+          <a:effectRef idx="0">
+            <a:schemeClr val="accent1"/>
+          </a:effectRef>
+          <a:fontRef idx="minor">
+            <a:schemeClr val="tx1"/>
+          </a:fontRef>
+        </p:style>
+      </p:cxnSp>
+      <p:cxnSp>
+        <p:nvCxnSpPr>
+          <p:cNvPr id="53" name="Conector recto de flecha 52">
+            <a:extLst>
+              <a:ext uri="{FF2B5EF4-FFF2-40B4-BE49-F238E27FC236}">
+                <a16:creationId xmlns:a16="http://schemas.microsoft.com/office/drawing/2014/main" id="{EEF96408-FE12-44F0-8C56-21E4E06D840A}"/>
+              </a:ext>
+            </a:extLst>
+          </p:cNvPr>
+          <p:cNvCxnSpPr>
+            <a:cxnSpLocks/>
+          </p:cNvCxnSpPr>
+          <p:nvPr/>
+        </p:nvCxnSpPr>
+        <p:spPr>
+          <a:xfrm>
+            <a:off x="3377034" y="5188747"/>
+            <a:ext cx="379498" cy="0"/>
+          </a:xfrm>
+          <a:prstGeom prst="straightConnector1">
+            <a:avLst/>
+          </a:prstGeom>
+          <a:ln w="12700">
+            <a:solidFill>
+              <a:schemeClr val="tx1"/>
+            </a:solidFill>
+            <a:tailEnd type="triangle"/>
+          </a:ln>
+        </p:spPr>
+        <p:style>
+          <a:lnRef idx="1">
+            <a:schemeClr val="accent1"/>
+          </a:lnRef>
+          <a:fillRef idx="0">
+            <a:schemeClr val="accent1"/>
+          </a:fillRef>
+          <a:effectRef idx="0">
+            <a:schemeClr val="accent1"/>
+          </a:effectRef>
+          <a:fontRef idx="minor">
+            <a:schemeClr val="tx1"/>
+          </a:fontRef>
+        </p:style>
+      </p:cxnSp>
+      <p:cxnSp>
+        <p:nvCxnSpPr>
+          <p:cNvPr id="54" name="Conector recto de flecha 53">
+            <a:extLst>
+              <a:ext uri="{FF2B5EF4-FFF2-40B4-BE49-F238E27FC236}">
+                <a16:creationId xmlns:a16="http://schemas.microsoft.com/office/drawing/2014/main" id="{65BEB4D8-20ED-421B-A403-0C4DAFCD606A}"/>
+              </a:ext>
+            </a:extLst>
+          </p:cNvPr>
+          <p:cNvCxnSpPr>
+            <a:cxnSpLocks/>
+          </p:cNvCxnSpPr>
+          <p:nvPr/>
+        </p:nvCxnSpPr>
+        <p:spPr>
+          <a:xfrm>
+            <a:off x="3374133" y="5347794"/>
+            <a:ext cx="379498" cy="0"/>
+          </a:xfrm>
+          <a:prstGeom prst="straightConnector1">
+            <a:avLst/>
+          </a:prstGeom>
+          <a:ln w="12700">
+            <a:solidFill>
+              <a:schemeClr val="tx1"/>
+            </a:solidFill>
+            <a:tailEnd type="triangle"/>
+          </a:ln>
+        </p:spPr>
+        <p:style>
+          <a:lnRef idx="1">
+            <a:schemeClr val="accent1"/>
+          </a:lnRef>
+          <a:fillRef idx="0">
+            <a:schemeClr val="accent1"/>
+          </a:fillRef>
+          <a:effectRef idx="0">
+            <a:schemeClr val="accent1"/>
+          </a:effectRef>
+          <a:fontRef idx="minor">
+            <a:schemeClr val="tx1"/>
+          </a:fontRef>
+        </p:style>
+      </p:cxnSp>
+      <p:cxnSp>
+        <p:nvCxnSpPr>
+          <p:cNvPr id="56" name="Conector recto de flecha 55">
+            <a:extLst>
+              <a:ext uri="{FF2B5EF4-FFF2-40B4-BE49-F238E27FC236}">
+                <a16:creationId xmlns:a16="http://schemas.microsoft.com/office/drawing/2014/main" id="{375B7017-53EE-416F-BA47-B59633D3767D}"/>
+              </a:ext>
+            </a:extLst>
+          </p:cNvPr>
+          <p:cNvCxnSpPr>
+            <a:cxnSpLocks/>
+          </p:cNvCxnSpPr>
+          <p:nvPr/>
+        </p:nvCxnSpPr>
+        <p:spPr>
+          <a:xfrm>
+            <a:off x="4173732" y="4062110"/>
+            <a:ext cx="668246" cy="0"/>
+          </a:xfrm>
+          <a:prstGeom prst="straightConnector1">
+            <a:avLst/>
+          </a:prstGeom>
+          <a:ln w="12700">
+            <a:solidFill>
+              <a:schemeClr val="tx1"/>
+            </a:solidFill>
+            <a:tailEnd type="triangle"/>
+          </a:ln>
+        </p:spPr>
+        <p:style>
+          <a:lnRef idx="1">
+            <a:schemeClr val="accent1"/>
+          </a:lnRef>
+          <a:fillRef idx="0">
+            <a:schemeClr val="accent1"/>
+          </a:fillRef>
+          <a:effectRef idx="0">
+            <a:schemeClr val="accent1"/>
+          </a:effectRef>
+          <a:fontRef idx="minor">
+            <a:schemeClr val="tx1"/>
+          </a:fontRef>
+        </p:style>
+      </p:cxnSp>
+      <p:cxnSp>
+        <p:nvCxnSpPr>
+          <p:cNvPr id="57" name="Conector recto de flecha 56">
+            <a:extLst>
+              <a:ext uri="{FF2B5EF4-FFF2-40B4-BE49-F238E27FC236}">
+                <a16:creationId xmlns:a16="http://schemas.microsoft.com/office/drawing/2014/main" id="{64AF57EA-A71A-44C4-A993-120925988A07}"/>
+              </a:ext>
+            </a:extLst>
+          </p:cNvPr>
+          <p:cNvCxnSpPr>
+            <a:cxnSpLocks/>
+          </p:cNvCxnSpPr>
+          <p:nvPr/>
+        </p:nvCxnSpPr>
+        <p:spPr>
+          <a:xfrm flipH="1">
+            <a:off x="4166376" y="4346714"/>
+            <a:ext cx="675602" cy="0"/>
+          </a:xfrm>
+          <a:prstGeom prst="straightConnector1">
+            <a:avLst/>
+          </a:prstGeom>
+          <a:ln w="12700">
+            <a:solidFill>
+              <a:schemeClr val="tx1"/>
+            </a:solidFill>
+            <a:tailEnd type="triangle"/>
+          </a:ln>
+        </p:spPr>
+        <p:style>
+          <a:lnRef idx="1">
+            <a:schemeClr val="accent1"/>
+          </a:lnRef>
+          <a:fillRef idx="0">
+            <a:schemeClr val="accent1"/>
+          </a:fillRef>
+          <a:effectRef idx="0">
+            <a:schemeClr val="accent1"/>
+          </a:effectRef>
+          <a:fontRef idx="minor">
+            <a:schemeClr val="tx1"/>
+          </a:fontRef>
+        </p:style>
+      </p:cxnSp>
+      <p:sp>
+        <p:nvSpPr>
+          <p:cNvPr id="58" name="CuadroTexto 57">
+            <a:extLst>
+              <a:ext uri="{FF2B5EF4-FFF2-40B4-BE49-F238E27FC236}">
+                <a16:creationId xmlns:a16="http://schemas.microsoft.com/office/drawing/2014/main" id="{79BF769C-28E6-4AB8-8963-C685FC269446}"/>
+              </a:ext>
+            </a:extLst>
+          </p:cNvPr>
+          <p:cNvSpPr txBox="1"/>
+          <p:nvPr/>
+        </p:nvSpPr>
+        <p:spPr>
+          <a:xfrm>
+            <a:off x="4468139" y="1637656"/>
+            <a:ext cx="906017" cy="230832"/>
+          </a:xfrm>
+          <a:prstGeom prst="rect">
+            <a:avLst/>
+          </a:prstGeom>
+          <a:noFill/>
+        </p:spPr>
+        <p:txBody>
+          <a:bodyPr wrap="none" rtlCol="0">
+            <a:spAutoFit/>
+          </a:bodyPr>
+          <a:lstStyle/>
+          <a:p>
+            <a:r>
+              <a:rPr lang="es-ES" sz="900" i="1" dirty="0"/>
+              <a:t>OUT_MESSAGE</a:t>
+            </a:r>
+          </a:p>
+        </p:txBody>
+      </p:sp>
+      <p:sp>
+        <p:nvSpPr>
+          <p:cNvPr id="59" name="CuadroTexto 58">
+            <a:extLst>
+              <a:ext uri="{FF2B5EF4-FFF2-40B4-BE49-F238E27FC236}">
+                <a16:creationId xmlns:a16="http://schemas.microsoft.com/office/drawing/2014/main" id="{319A5172-03C7-4B2B-92B1-B93D5D550FD2}"/>
+              </a:ext>
+            </a:extLst>
+          </p:cNvPr>
+          <p:cNvSpPr txBox="1"/>
+          <p:nvPr/>
+        </p:nvSpPr>
+        <p:spPr>
+          <a:xfrm>
+            <a:off x="674697" y="2198688"/>
+            <a:ext cx="774571" cy="230832"/>
+          </a:xfrm>
+          <a:prstGeom prst="rect">
+            <a:avLst/>
+          </a:prstGeom>
+          <a:noFill/>
+        </p:spPr>
+        <p:txBody>
+          <a:bodyPr wrap="none" rtlCol="0">
+            <a:spAutoFit/>
+          </a:bodyPr>
+          <a:lstStyle/>
+          <a:p>
+            <a:r>
+              <a:rPr lang="es-ES" sz="900" i="1" dirty="0"/>
+              <a:t>OK_BUTTON</a:t>
+            </a:r>
+          </a:p>
+        </p:txBody>
+      </p:sp>
+      <p:sp>
+        <p:nvSpPr>
+          <p:cNvPr id="60" name="CuadroTexto 59">
+            <a:extLst>
+              <a:ext uri="{FF2B5EF4-FFF2-40B4-BE49-F238E27FC236}">
+                <a16:creationId xmlns:a16="http://schemas.microsoft.com/office/drawing/2014/main" id="{413448F3-1DB5-427F-B64E-B3EA01488AC8}"/>
+              </a:ext>
+            </a:extLst>
+          </p:cNvPr>
+          <p:cNvSpPr txBox="1"/>
+          <p:nvPr/>
+        </p:nvSpPr>
+        <p:spPr>
+          <a:xfrm>
+            <a:off x="849424" y="1927525"/>
+            <a:ext cx="599844" cy="230832"/>
+          </a:xfrm>
+          <a:prstGeom prst="rect">
+            <a:avLst/>
+          </a:prstGeom>
+          <a:noFill/>
+        </p:spPr>
+        <p:txBody>
+          <a:bodyPr wrap="none" rtlCol="0">
+            <a:spAutoFit/>
+          </a:bodyPr>
+          <a:lstStyle/>
+          <a:p>
+            <a:r>
+              <a:rPr lang="es-ES" sz="900" i="1" dirty="0"/>
+              <a:t>RESET_N</a:t>
+            </a:r>
+          </a:p>
+        </p:txBody>
+      </p:sp>
+      <p:sp>
+        <p:nvSpPr>
+          <p:cNvPr id="61" name="CuadroTexto 60">
+            <a:extLst>
+              <a:ext uri="{FF2B5EF4-FFF2-40B4-BE49-F238E27FC236}">
+                <a16:creationId xmlns:a16="http://schemas.microsoft.com/office/drawing/2014/main" id="{6BB2DBA4-3FE1-4AC4-8212-D2051ABFF1D3}"/>
+              </a:ext>
+            </a:extLst>
+          </p:cNvPr>
+          <p:cNvSpPr txBox="1"/>
+          <p:nvPr/>
+        </p:nvSpPr>
+        <p:spPr>
+          <a:xfrm>
+            <a:off x="845436" y="1696694"/>
+            <a:ext cx="352982" cy="230832"/>
+          </a:xfrm>
+          <a:prstGeom prst="rect">
+            <a:avLst/>
+          </a:prstGeom>
+          <a:noFill/>
+        </p:spPr>
+        <p:txBody>
+          <a:bodyPr wrap="none" rtlCol="0">
+            <a:spAutoFit/>
+          </a:bodyPr>
+          <a:lstStyle/>
+          <a:p>
+            <a:r>
+              <a:rPr lang="es-ES" sz="900" i="1" dirty="0"/>
+              <a:t>CLK</a:t>
+            </a:r>
+          </a:p>
+        </p:txBody>
+      </p:sp>
+      <p:sp>
+        <p:nvSpPr>
+          <p:cNvPr id="62" name="CuadroTexto 61">
+            <a:extLst>
+              <a:ext uri="{FF2B5EF4-FFF2-40B4-BE49-F238E27FC236}">
+                <a16:creationId xmlns:a16="http://schemas.microsoft.com/office/drawing/2014/main" id="{A6C871AB-EF38-4F9F-8AC1-F080FFAA14EA}"/>
+              </a:ext>
+            </a:extLst>
+          </p:cNvPr>
+          <p:cNvSpPr txBox="1"/>
+          <p:nvPr/>
+        </p:nvSpPr>
+        <p:spPr>
+          <a:xfrm>
+            <a:off x="4955262" y="3567001"/>
+            <a:ext cx="386116" cy="230832"/>
+          </a:xfrm>
+          <a:prstGeom prst="rect">
+            <a:avLst/>
+          </a:prstGeom>
+          <a:noFill/>
+        </p:spPr>
+        <p:txBody>
+          <a:bodyPr wrap="square" rtlCol="0">
+            <a:spAutoFit/>
+          </a:bodyPr>
+          <a:lstStyle/>
+          <a:p>
+            <a:r>
+              <a:rPr lang="es-ES" sz="900" i="1" dirty="0"/>
+              <a:t>LED</a:t>
+            </a:r>
+          </a:p>
+        </p:txBody>
+      </p:sp>
+      <p:sp>
+        <p:nvSpPr>
+          <p:cNvPr id="66" name="CuadroTexto 65">
+            <a:extLst>
+              <a:ext uri="{FF2B5EF4-FFF2-40B4-BE49-F238E27FC236}">
+                <a16:creationId xmlns:a16="http://schemas.microsoft.com/office/drawing/2014/main" id="{86396181-176F-415E-836E-511A097F0D1B}"/>
+              </a:ext>
+            </a:extLst>
+          </p:cNvPr>
+          <p:cNvSpPr txBox="1"/>
+          <p:nvPr/>
+        </p:nvSpPr>
+        <p:spPr>
+          <a:xfrm>
+            <a:off x="3128305" y="4718972"/>
+            <a:ext cx="643125" cy="200055"/>
+          </a:xfrm>
+          <a:prstGeom prst="rect">
+            <a:avLst/>
+          </a:prstGeom>
+          <a:noFill/>
+        </p:spPr>
+        <p:txBody>
+          <a:bodyPr wrap="none" rtlCol="0">
+            <a:spAutoFit/>
+          </a:bodyPr>
+          <a:lstStyle/>
+          <a:p>
+            <a:r>
+              <a:rPr lang="es-ES" sz="700" i="1" dirty="0"/>
+              <a:t>UP_BUTTON</a:t>
+            </a:r>
+          </a:p>
+        </p:txBody>
+      </p:sp>
+      <p:sp>
+        <p:nvSpPr>
+          <p:cNvPr id="67" name="CuadroTexto 66">
+            <a:extLst>
+              <a:ext uri="{FF2B5EF4-FFF2-40B4-BE49-F238E27FC236}">
+                <a16:creationId xmlns:a16="http://schemas.microsoft.com/office/drawing/2014/main" id="{F398F2D6-56E2-4F05-BCC9-9090215378F4}"/>
+              </a:ext>
+            </a:extLst>
+          </p:cNvPr>
+          <p:cNvSpPr txBox="1"/>
+          <p:nvPr/>
+        </p:nvSpPr>
+        <p:spPr>
+          <a:xfrm>
+            <a:off x="2981733" y="4871910"/>
+            <a:ext cx="790601" cy="200055"/>
+          </a:xfrm>
+          <a:prstGeom prst="rect">
+            <a:avLst/>
+          </a:prstGeom>
+          <a:noFill/>
+        </p:spPr>
+        <p:txBody>
+          <a:bodyPr wrap="none" rtlCol="0">
+            <a:spAutoFit/>
+          </a:bodyPr>
+          <a:lstStyle/>
+          <a:p>
+            <a:r>
+              <a:rPr lang="es-ES" sz="700" i="1" dirty="0"/>
+              <a:t>DOWN_BUTTON</a:t>
+            </a:r>
+          </a:p>
+        </p:txBody>
+      </p:sp>
+      <p:sp>
+        <p:nvSpPr>
+          <p:cNvPr id="68" name="CuadroTexto 67">
+            <a:extLst>
+              <a:ext uri="{FF2B5EF4-FFF2-40B4-BE49-F238E27FC236}">
+                <a16:creationId xmlns:a16="http://schemas.microsoft.com/office/drawing/2014/main" id="{8B2A0000-229C-46FA-99F1-A1B9D6BA1C4E}"/>
+              </a:ext>
+            </a:extLst>
+          </p:cNvPr>
+          <p:cNvSpPr txBox="1"/>
+          <p:nvPr/>
+        </p:nvSpPr>
+        <p:spPr>
+          <a:xfrm>
+            <a:off x="3064780" y="5049155"/>
+            <a:ext cx="705642" cy="200055"/>
+          </a:xfrm>
+          <a:prstGeom prst="rect">
+            <a:avLst/>
+          </a:prstGeom>
+          <a:noFill/>
+        </p:spPr>
+        <p:txBody>
+          <a:bodyPr wrap="none" rtlCol="0">
+            <a:spAutoFit/>
+          </a:bodyPr>
+          <a:lstStyle/>
+          <a:p>
+            <a:r>
+              <a:rPr lang="es-ES" sz="700" i="1" dirty="0"/>
+              <a:t>LEFT_BUTTON</a:t>
+            </a:r>
+          </a:p>
+        </p:txBody>
+      </p:sp>
+      <p:sp>
+        <p:nvSpPr>
+          <p:cNvPr id="69" name="CuadroTexto 68">
+            <a:extLst>
+              <a:ext uri="{FF2B5EF4-FFF2-40B4-BE49-F238E27FC236}">
+                <a16:creationId xmlns:a16="http://schemas.microsoft.com/office/drawing/2014/main" id="{582B6678-571B-4B8C-A794-94D79F1060C0}"/>
+              </a:ext>
+            </a:extLst>
+          </p:cNvPr>
+          <p:cNvSpPr txBox="1"/>
+          <p:nvPr/>
+        </p:nvSpPr>
+        <p:spPr>
+          <a:xfrm>
+            <a:off x="2999028" y="5204316"/>
+            <a:ext cx="764953" cy="200055"/>
+          </a:xfrm>
+          <a:prstGeom prst="rect">
+            <a:avLst/>
+          </a:prstGeom>
+          <a:noFill/>
+        </p:spPr>
+        <p:txBody>
+          <a:bodyPr wrap="none" rtlCol="0">
+            <a:spAutoFit/>
+          </a:bodyPr>
+          <a:lstStyle/>
+          <a:p>
+            <a:r>
+              <a:rPr lang="es-ES" sz="700" i="1" dirty="0"/>
+              <a:t>RIGHT_BUTTON</a:t>
+            </a:r>
+          </a:p>
+        </p:txBody>
+      </p:sp>
+      <p:cxnSp>
+        <p:nvCxnSpPr>
+          <p:cNvPr id="70" name="Conector recto de flecha 69">
+            <a:extLst>
+              <a:ext uri="{FF2B5EF4-FFF2-40B4-BE49-F238E27FC236}">
+                <a16:creationId xmlns:a16="http://schemas.microsoft.com/office/drawing/2014/main" id="{A6775B3D-6D09-4E0A-B8CE-B4432D1B11B2}"/>
+              </a:ext>
+            </a:extLst>
+          </p:cNvPr>
+          <p:cNvCxnSpPr>
+            <a:cxnSpLocks/>
+          </p:cNvCxnSpPr>
+          <p:nvPr/>
+        </p:nvCxnSpPr>
+        <p:spPr>
+          <a:xfrm>
+            <a:off x="2787095" y="3822467"/>
+            <a:ext cx="690879" cy="0"/>
+          </a:xfrm>
+          <a:prstGeom prst="straightConnector1">
+            <a:avLst/>
+          </a:prstGeom>
+          <a:ln w="12700">
+            <a:solidFill>
+              <a:schemeClr val="tx1"/>
+            </a:solidFill>
+            <a:tailEnd type="triangle"/>
+          </a:ln>
+        </p:spPr>
+        <p:style>
+          <a:lnRef idx="1">
+            <a:schemeClr val="accent1"/>
+          </a:lnRef>
+          <a:fillRef idx="0">
+            <a:schemeClr val="accent1"/>
+          </a:fillRef>
+          <a:effectRef idx="0">
+            <a:schemeClr val="accent1"/>
+          </a:effectRef>
+          <a:fontRef idx="minor">
+            <a:schemeClr val="tx1"/>
+          </a:fontRef>
+        </p:style>
+      </p:cxnSp>
+      <p:cxnSp>
+        <p:nvCxnSpPr>
+          <p:cNvPr id="71" name="Conector recto de flecha 70">
+            <a:extLst>
+              <a:ext uri="{FF2B5EF4-FFF2-40B4-BE49-F238E27FC236}">
+                <a16:creationId xmlns:a16="http://schemas.microsoft.com/office/drawing/2014/main" id="{75185600-3E4A-465D-9E26-FD91EF862EC4}"/>
+              </a:ext>
+            </a:extLst>
+          </p:cNvPr>
+          <p:cNvCxnSpPr>
+            <a:cxnSpLocks/>
+          </p:cNvCxnSpPr>
+          <p:nvPr/>
+        </p:nvCxnSpPr>
+        <p:spPr>
+          <a:xfrm flipH="1">
+            <a:off x="2787095" y="4303921"/>
+            <a:ext cx="675602" cy="0"/>
+          </a:xfrm>
+          <a:prstGeom prst="straightConnector1">
+            <a:avLst/>
+          </a:prstGeom>
+          <a:ln w="12700">
+            <a:solidFill>
+              <a:schemeClr val="tx1"/>
+            </a:solidFill>
+            <a:tailEnd type="triangle"/>
+          </a:ln>
+        </p:spPr>
+        <p:style>
+          <a:lnRef idx="1">
+            <a:schemeClr val="accent1"/>
+          </a:lnRef>
+          <a:fillRef idx="0">
+            <a:schemeClr val="accent1"/>
+          </a:fillRef>
+          <a:effectRef idx="0">
+            <a:schemeClr val="accent1"/>
+          </a:effectRef>
+          <a:fontRef idx="minor">
+            <a:schemeClr val="tx1"/>
+          </a:fontRef>
+        </p:style>
+      </p:cxnSp>
+      <p:cxnSp>
+        <p:nvCxnSpPr>
+          <p:cNvPr id="72" name="Conector recto de flecha 71">
+            <a:extLst>
+              <a:ext uri="{FF2B5EF4-FFF2-40B4-BE49-F238E27FC236}">
+                <a16:creationId xmlns:a16="http://schemas.microsoft.com/office/drawing/2014/main" id="{43C1CD7C-55FA-4327-B7B2-EABCEB68E718}"/>
+              </a:ext>
+            </a:extLst>
+          </p:cNvPr>
+          <p:cNvCxnSpPr>
+            <a:cxnSpLocks/>
+          </p:cNvCxnSpPr>
+          <p:nvPr/>
+        </p:nvCxnSpPr>
+        <p:spPr>
+          <a:xfrm>
+            <a:off x="2787095" y="4070881"/>
+            <a:ext cx="690879" cy="0"/>
+          </a:xfrm>
+          <a:prstGeom prst="straightConnector1">
+            <a:avLst/>
+          </a:prstGeom>
+          <a:ln w="12700">
+            <a:solidFill>
+              <a:schemeClr val="tx1"/>
+            </a:solidFill>
+            <a:tailEnd type="triangle"/>
+          </a:ln>
+        </p:spPr>
+        <p:style>
+          <a:lnRef idx="1">
+            <a:schemeClr val="accent1"/>
+          </a:lnRef>
+          <a:fillRef idx="0">
+            <a:schemeClr val="accent1"/>
+          </a:fillRef>
+          <a:effectRef idx="0">
+            <a:schemeClr val="accent1"/>
+          </a:effectRef>
+          <a:fontRef idx="minor">
+            <a:schemeClr val="tx1"/>
+          </a:fontRef>
+        </p:style>
+      </p:cxnSp>
+      <p:cxnSp>
+        <p:nvCxnSpPr>
+          <p:cNvPr id="75" name="Conector recto de flecha 74">
+            <a:extLst>
+              <a:ext uri="{FF2B5EF4-FFF2-40B4-BE49-F238E27FC236}">
+                <a16:creationId xmlns:a16="http://schemas.microsoft.com/office/drawing/2014/main" id="{7BF5EAA3-7A88-4CB6-8F19-A9C6A6A15579}"/>
+              </a:ext>
+            </a:extLst>
+          </p:cNvPr>
+          <p:cNvCxnSpPr>
+            <a:cxnSpLocks/>
+          </p:cNvCxnSpPr>
+          <p:nvPr/>
+        </p:nvCxnSpPr>
+        <p:spPr>
+          <a:xfrm>
+            <a:off x="4434812" y="5364364"/>
+            <a:ext cx="1661188" cy="0"/>
+          </a:xfrm>
+          <a:prstGeom prst="straightConnector1">
+            <a:avLst/>
+          </a:prstGeom>
+          <a:ln w="12700">
+            <a:solidFill>
+              <a:schemeClr val="tx1"/>
+            </a:solidFill>
+            <a:tailEnd type="triangle"/>
+          </a:ln>
+        </p:spPr>
+        <p:style>
+          <a:lnRef idx="1">
+            <a:schemeClr val="accent1"/>
+          </a:lnRef>
+          <a:fillRef idx="0">
+            <a:schemeClr val="accent1"/>
+          </a:fillRef>
+          <a:effectRef idx="0">
+            <a:schemeClr val="accent1"/>
+          </a:effectRef>
+          <a:fontRef idx="minor">
+            <a:schemeClr val="tx1"/>
+          </a:fontRef>
+        </p:style>
+      </p:cxnSp>
+      <p:sp>
+        <p:nvSpPr>
+          <p:cNvPr id="76" name="CuadroTexto 75">
+            <a:extLst>
+              <a:ext uri="{FF2B5EF4-FFF2-40B4-BE49-F238E27FC236}">
+                <a16:creationId xmlns:a16="http://schemas.microsoft.com/office/drawing/2014/main" id="{7BB90A36-6ED8-46DE-B10E-497548D34338}"/>
+              </a:ext>
+            </a:extLst>
+          </p:cNvPr>
+          <p:cNvSpPr txBox="1"/>
+          <p:nvPr/>
+        </p:nvSpPr>
+        <p:spPr>
+          <a:xfrm>
+            <a:off x="4979636" y="5166476"/>
+            <a:ext cx="634303" cy="230832"/>
+          </a:xfrm>
+          <a:prstGeom prst="rect">
+            <a:avLst/>
+          </a:prstGeom>
+          <a:noFill/>
+        </p:spPr>
+        <p:txBody>
+          <a:bodyPr wrap="square" rtlCol="0">
+            <a:spAutoFit/>
+          </a:bodyPr>
+          <a:lstStyle/>
+          <a:p>
+            <a:r>
+              <a:rPr lang="es-ES" sz="900" i="1" dirty="0"/>
+              <a:t>ATTEMPS</a:t>
+            </a:r>
+          </a:p>
+        </p:txBody>
+      </p:sp>
+      <p:cxnSp>
+        <p:nvCxnSpPr>
+          <p:cNvPr id="77" name="Conector recto de flecha 76">
+            <a:extLst>
+              <a:ext uri="{FF2B5EF4-FFF2-40B4-BE49-F238E27FC236}">
+                <a16:creationId xmlns:a16="http://schemas.microsoft.com/office/drawing/2014/main" id="{0B0F0C52-55B4-46A8-A428-F1F5EC973123}"/>
+              </a:ext>
+            </a:extLst>
+          </p:cNvPr>
+          <p:cNvCxnSpPr>
+            <a:cxnSpLocks/>
+          </p:cNvCxnSpPr>
+          <p:nvPr/>
+        </p:nvCxnSpPr>
+        <p:spPr>
+          <a:xfrm>
+            <a:off x="2772383" y="5482249"/>
+            <a:ext cx="969537" cy="0"/>
+          </a:xfrm>
+          <a:prstGeom prst="straightConnector1">
+            <a:avLst/>
+          </a:prstGeom>
+          <a:ln w="12700">
+            <a:solidFill>
+              <a:schemeClr val="tx1"/>
+            </a:solidFill>
+            <a:tailEnd type="triangle"/>
+          </a:ln>
+        </p:spPr>
+        <p:style>
+          <a:lnRef idx="1">
+            <a:schemeClr val="accent1"/>
+          </a:lnRef>
+          <a:fillRef idx="0">
+            <a:schemeClr val="accent1"/>
+          </a:fillRef>
+          <a:effectRef idx="0">
+            <a:schemeClr val="accent1"/>
+          </a:effectRef>
+          <a:fontRef idx="minor">
+            <a:schemeClr val="tx1"/>
+          </a:fontRef>
+        </p:style>
+      </p:cxnSp>
+      <p:cxnSp>
+        <p:nvCxnSpPr>
+          <p:cNvPr id="78" name="Conector recto de flecha 77">
+            <a:extLst>
+              <a:ext uri="{FF2B5EF4-FFF2-40B4-BE49-F238E27FC236}">
+                <a16:creationId xmlns:a16="http://schemas.microsoft.com/office/drawing/2014/main" id="{FC8F1957-9C9C-4F32-9345-97F5293BB878}"/>
+              </a:ext>
+            </a:extLst>
+          </p:cNvPr>
+          <p:cNvCxnSpPr>
+            <a:cxnSpLocks/>
+          </p:cNvCxnSpPr>
+          <p:nvPr/>
+        </p:nvCxnSpPr>
+        <p:spPr>
+          <a:xfrm flipH="1">
+            <a:off x="2772383" y="5954921"/>
+            <a:ext cx="991598" cy="0"/>
+          </a:xfrm>
+          <a:prstGeom prst="straightConnector1">
+            <a:avLst/>
+          </a:prstGeom>
+          <a:ln w="12700">
+            <a:solidFill>
+              <a:schemeClr val="tx1"/>
+            </a:solidFill>
+            <a:tailEnd type="triangle"/>
+          </a:ln>
+        </p:spPr>
+        <p:style>
+          <a:lnRef idx="1">
+            <a:schemeClr val="accent1"/>
+          </a:lnRef>
+          <a:fillRef idx="0">
+            <a:schemeClr val="accent1"/>
+          </a:fillRef>
+          <a:effectRef idx="0">
+            <a:schemeClr val="accent1"/>
+          </a:effectRef>
+          <a:fontRef idx="minor">
+            <a:schemeClr val="tx1"/>
+          </a:fontRef>
+        </p:style>
+      </p:cxnSp>
+      <p:cxnSp>
+        <p:nvCxnSpPr>
+          <p:cNvPr id="79" name="Conector recto de flecha 78">
+            <a:extLst>
+              <a:ext uri="{FF2B5EF4-FFF2-40B4-BE49-F238E27FC236}">
+                <a16:creationId xmlns:a16="http://schemas.microsoft.com/office/drawing/2014/main" id="{C9A1B49F-112E-4340-960A-4CB34A50EE14}"/>
+              </a:ext>
+            </a:extLst>
+          </p:cNvPr>
+          <p:cNvCxnSpPr>
+            <a:cxnSpLocks/>
+          </p:cNvCxnSpPr>
+          <p:nvPr/>
+        </p:nvCxnSpPr>
+        <p:spPr>
+          <a:xfrm>
+            <a:off x="2772383" y="5721881"/>
+            <a:ext cx="974795" cy="0"/>
+          </a:xfrm>
+          <a:prstGeom prst="straightConnector1">
+            <a:avLst/>
+          </a:prstGeom>
+          <a:ln w="12700">
+            <a:solidFill>
+              <a:schemeClr val="tx1"/>
+            </a:solidFill>
+            <a:tailEnd type="triangle"/>
+          </a:ln>
+        </p:spPr>
+        <p:style>
+          <a:lnRef idx="1">
+            <a:schemeClr val="accent1"/>
+          </a:lnRef>
+          <a:fillRef idx="0">
+            <a:schemeClr val="accent1"/>
+          </a:fillRef>
+          <a:effectRef idx="0">
+            <a:schemeClr val="accent1"/>
+          </a:effectRef>
+          <a:fontRef idx="minor">
+            <a:schemeClr val="tx1"/>
+          </a:fontRef>
+        </p:style>
+      </p:cxnSp>
+      <p:sp>
+        <p:nvSpPr>
+          <p:cNvPr id="95" name="CuadroTexto 94">
+            <a:extLst>
+              <a:ext uri="{FF2B5EF4-FFF2-40B4-BE49-F238E27FC236}">
+                <a16:creationId xmlns:a16="http://schemas.microsoft.com/office/drawing/2014/main" id="{03C442A2-1E5F-4AB5-881A-BA0FFD99FCCE}"/>
+              </a:ext>
+            </a:extLst>
+          </p:cNvPr>
+          <p:cNvSpPr txBox="1"/>
+          <p:nvPr/>
+        </p:nvSpPr>
+        <p:spPr>
+          <a:xfrm>
+            <a:off x="2720527" y="5324429"/>
+            <a:ext cx="410690" cy="200055"/>
+          </a:xfrm>
+          <a:prstGeom prst="rect">
+            <a:avLst/>
+          </a:prstGeom>
+          <a:noFill/>
+        </p:spPr>
+        <p:txBody>
+          <a:bodyPr wrap="none" rtlCol="0">
+            <a:spAutoFit/>
+          </a:bodyPr>
+          <a:lstStyle/>
+          <a:p>
+            <a:r>
+              <a:rPr lang="es-ES" sz="700" i="1" dirty="0"/>
+              <a:t>START</a:t>
+            </a:r>
+          </a:p>
+        </p:txBody>
+      </p:sp>
+      <p:sp>
+        <p:nvSpPr>
+          <p:cNvPr id="96" name="CuadroTexto 95">
+            <a:extLst>
+              <a:ext uri="{FF2B5EF4-FFF2-40B4-BE49-F238E27FC236}">
+                <a16:creationId xmlns:a16="http://schemas.microsoft.com/office/drawing/2014/main" id="{A9A2AF09-44F2-46D6-94F6-AD717DA1A270}"/>
+              </a:ext>
+            </a:extLst>
+          </p:cNvPr>
+          <p:cNvSpPr txBox="1"/>
+          <p:nvPr/>
+        </p:nvSpPr>
+        <p:spPr>
+          <a:xfrm>
+            <a:off x="2782180" y="5781855"/>
+            <a:ext cx="399468" cy="200055"/>
+          </a:xfrm>
+          <a:prstGeom prst="rect">
+            <a:avLst/>
+          </a:prstGeom>
+          <a:noFill/>
+        </p:spPr>
+        <p:txBody>
+          <a:bodyPr wrap="none" rtlCol="0">
+            <a:spAutoFit/>
+          </a:bodyPr>
+          <a:lstStyle/>
+          <a:p>
+            <a:r>
+              <a:rPr lang="es-ES" sz="700" i="1" dirty="0"/>
+              <a:t>DONE</a:t>
+            </a:r>
+          </a:p>
+        </p:txBody>
+      </p:sp>
+      <p:sp>
+        <p:nvSpPr>
+          <p:cNvPr id="97" name="CuadroTexto 96">
+            <a:extLst>
+              <a:ext uri="{FF2B5EF4-FFF2-40B4-BE49-F238E27FC236}">
+                <a16:creationId xmlns:a16="http://schemas.microsoft.com/office/drawing/2014/main" id="{C2575A3F-F2F8-4C68-A76F-FAC0796116D2}"/>
+              </a:ext>
+            </a:extLst>
+          </p:cNvPr>
+          <p:cNvSpPr txBox="1"/>
+          <p:nvPr/>
+        </p:nvSpPr>
+        <p:spPr>
+          <a:xfrm>
+            <a:off x="2724966" y="5562107"/>
+            <a:ext cx="458780" cy="200055"/>
+          </a:xfrm>
+          <a:prstGeom prst="rect">
+            <a:avLst/>
+          </a:prstGeom>
+          <a:noFill/>
+        </p:spPr>
+        <p:txBody>
+          <a:bodyPr wrap="none" rtlCol="0">
+            <a:spAutoFit/>
+          </a:bodyPr>
+          <a:lstStyle/>
+          <a:p>
+            <a:r>
+              <a:rPr lang="es-ES" sz="700" i="1" dirty="0"/>
+              <a:t>PARAM</a:t>
+            </a:r>
+          </a:p>
+        </p:txBody>
+      </p:sp>
+      <p:sp>
+        <p:nvSpPr>
+          <p:cNvPr id="98" name="CuadroTexto 97">
+            <a:extLst>
+              <a:ext uri="{FF2B5EF4-FFF2-40B4-BE49-F238E27FC236}">
+                <a16:creationId xmlns:a16="http://schemas.microsoft.com/office/drawing/2014/main" id="{3D761AC8-7FA5-4072-A664-F2A42A5E458C}"/>
+              </a:ext>
+            </a:extLst>
+          </p:cNvPr>
+          <p:cNvSpPr txBox="1"/>
+          <p:nvPr/>
+        </p:nvSpPr>
+        <p:spPr>
+          <a:xfrm>
+            <a:off x="2725118" y="3679076"/>
+            <a:ext cx="410690" cy="200055"/>
+          </a:xfrm>
+          <a:prstGeom prst="rect">
+            <a:avLst/>
+          </a:prstGeom>
+          <a:noFill/>
+        </p:spPr>
+        <p:txBody>
+          <a:bodyPr wrap="none" rtlCol="0">
+            <a:spAutoFit/>
+          </a:bodyPr>
+          <a:lstStyle/>
+          <a:p>
+            <a:r>
+              <a:rPr lang="es-ES" sz="700" i="1" dirty="0"/>
+              <a:t>START</a:t>
+            </a:r>
+          </a:p>
+        </p:txBody>
+      </p:sp>
+      <p:sp>
+        <p:nvSpPr>
+          <p:cNvPr id="99" name="CuadroTexto 98">
+            <a:extLst>
+              <a:ext uri="{FF2B5EF4-FFF2-40B4-BE49-F238E27FC236}">
+                <a16:creationId xmlns:a16="http://schemas.microsoft.com/office/drawing/2014/main" id="{10299C51-9074-4618-A5CA-D0E88B05F08B}"/>
+              </a:ext>
+            </a:extLst>
+          </p:cNvPr>
+          <p:cNvSpPr txBox="1"/>
+          <p:nvPr/>
+        </p:nvSpPr>
+        <p:spPr>
+          <a:xfrm>
+            <a:off x="2786771" y="4136502"/>
+            <a:ext cx="399468" cy="200055"/>
+          </a:xfrm>
+          <a:prstGeom prst="rect">
+            <a:avLst/>
+          </a:prstGeom>
+          <a:noFill/>
+        </p:spPr>
+        <p:txBody>
+          <a:bodyPr wrap="none" rtlCol="0">
+            <a:spAutoFit/>
+          </a:bodyPr>
+          <a:lstStyle/>
+          <a:p>
+            <a:r>
+              <a:rPr lang="es-ES" sz="700" i="1" dirty="0"/>
+              <a:t>DONE</a:t>
+            </a:r>
+          </a:p>
+        </p:txBody>
+      </p:sp>
+      <p:sp>
+        <p:nvSpPr>
+          <p:cNvPr id="100" name="CuadroTexto 99">
+            <a:extLst>
+              <a:ext uri="{FF2B5EF4-FFF2-40B4-BE49-F238E27FC236}">
+                <a16:creationId xmlns:a16="http://schemas.microsoft.com/office/drawing/2014/main" id="{459B51C6-4EA4-48E1-B6A6-3CC7DF78F2FA}"/>
+              </a:ext>
+            </a:extLst>
+          </p:cNvPr>
+          <p:cNvSpPr txBox="1"/>
+          <p:nvPr/>
+        </p:nvSpPr>
+        <p:spPr>
+          <a:xfrm>
+            <a:off x="2729557" y="3916754"/>
+            <a:ext cx="458780" cy="200055"/>
+          </a:xfrm>
+          <a:prstGeom prst="rect">
+            <a:avLst/>
+          </a:prstGeom>
+          <a:noFill/>
+        </p:spPr>
+        <p:txBody>
+          <a:bodyPr wrap="none" rtlCol="0">
+            <a:spAutoFit/>
+          </a:bodyPr>
+          <a:lstStyle/>
+          <a:p>
+            <a:r>
+              <a:rPr lang="es-ES" sz="700" i="1" dirty="0"/>
+              <a:t>PARAM</a:t>
+            </a:r>
+          </a:p>
+        </p:txBody>
+      </p:sp>
+      <p:sp>
+        <p:nvSpPr>
+          <p:cNvPr id="101" name="CuadroTexto 100">
+            <a:extLst>
+              <a:ext uri="{FF2B5EF4-FFF2-40B4-BE49-F238E27FC236}">
+                <a16:creationId xmlns:a16="http://schemas.microsoft.com/office/drawing/2014/main" id="{A2C87B76-7D99-4664-8D2B-1F8E74C6A6EA}"/>
+              </a:ext>
+            </a:extLst>
+          </p:cNvPr>
+          <p:cNvSpPr txBox="1"/>
+          <p:nvPr/>
+        </p:nvSpPr>
+        <p:spPr>
+          <a:xfrm>
+            <a:off x="2720527" y="2881567"/>
+            <a:ext cx="410690" cy="200055"/>
+          </a:xfrm>
+          <a:prstGeom prst="rect">
+            <a:avLst/>
+          </a:prstGeom>
+          <a:noFill/>
+        </p:spPr>
+        <p:txBody>
+          <a:bodyPr wrap="none" rtlCol="0">
+            <a:spAutoFit/>
+          </a:bodyPr>
+          <a:lstStyle/>
+          <a:p>
+            <a:r>
+              <a:rPr lang="es-ES" sz="700" i="1" dirty="0"/>
+              <a:t>START</a:t>
+            </a:r>
+          </a:p>
+        </p:txBody>
+      </p:sp>
+      <p:sp>
+        <p:nvSpPr>
+          <p:cNvPr id="102" name="CuadroTexto 101">
+            <a:extLst>
+              <a:ext uri="{FF2B5EF4-FFF2-40B4-BE49-F238E27FC236}">
+                <a16:creationId xmlns:a16="http://schemas.microsoft.com/office/drawing/2014/main" id="{326BE02D-4A95-4D0B-86BB-B8438CF23D46}"/>
+              </a:ext>
+            </a:extLst>
+          </p:cNvPr>
+          <p:cNvSpPr txBox="1"/>
+          <p:nvPr/>
+        </p:nvSpPr>
+        <p:spPr>
+          <a:xfrm>
+            <a:off x="2766797" y="3176489"/>
+            <a:ext cx="399468" cy="200055"/>
+          </a:xfrm>
+          <a:prstGeom prst="rect">
+            <a:avLst/>
+          </a:prstGeom>
+          <a:noFill/>
+        </p:spPr>
+        <p:txBody>
+          <a:bodyPr wrap="none" rtlCol="0">
+            <a:spAutoFit/>
+          </a:bodyPr>
+          <a:lstStyle/>
+          <a:p>
+            <a:r>
+              <a:rPr lang="es-ES" sz="700" i="1" dirty="0"/>
+              <a:t>DONE</a:t>
+            </a:r>
+          </a:p>
+        </p:txBody>
+      </p:sp>
+      <p:sp>
+        <p:nvSpPr>
+          <p:cNvPr id="103" name="CuadroTexto 102">
+            <a:extLst>
+              <a:ext uri="{FF2B5EF4-FFF2-40B4-BE49-F238E27FC236}">
+                <a16:creationId xmlns:a16="http://schemas.microsoft.com/office/drawing/2014/main" id="{70E2C165-BF80-4022-899A-AFB52BC17DB6}"/>
+              </a:ext>
+            </a:extLst>
+          </p:cNvPr>
+          <p:cNvSpPr txBox="1"/>
+          <p:nvPr/>
+        </p:nvSpPr>
+        <p:spPr>
+          <a:xfrm>
+            <a:off x="4119846" y="3910666"/>
+            <a:ext cx="410690" cy="200055"/>
+          </a:xfrm>
+          <a:prstGeom prst="rect">
+            <a:avLst/>
+          </a:prstGeom>
+          <a:noFill/>
+        </p:spPr>
+        <p:txBody>
+          <a:bodyPr wrap="none" rtlCol="0">
+            <a:spAutoFit/>
+          </a:bodyPr>
+          <a:lstStyle/>
+          <a:p>
+            <a:r>
+              <a:rPr lang="es-ES" sz="700" i="1" dirty="0"/>
+              <a:t>START</a:t>
+            </a:r>
+          </a:p>
+        </p:txBody>
+      </p:sp>
+      <p:sp>
+        <p:nvSpPr>
+          <p:cNvPr id="104" name="CuadroTexto 103">
+            <a:extLst>
+              <a:ext uri="{FF2B5EF4-FFF2-40B4-BE49-F238E27FC236}">
+                <a16:creationId xmlns:a16="http://schemas.microsoft.com/office/drawing/2014/main" id="{A896D679-2B9B-46EE-AA3A-1C27556817A2}"/>
+              </a:ext>
+            </a:extLst>
+          </p:cNvPr>
+          <p:cNvSpPr txBox="1"/>
+          <p:nvPr/>
+        </p:nvSpPr>
+        <p:spPr>
+          <a:xfrm>
+            <a:off x="4166116" y="4205588"/>
+            <a:ext cx="399468" cy="200055"/>
+          </a:xfrm>
+          <a:prstGeom prst="rect">
+            <a:avLst/>
+          </a:prstGeom>
+          <a:noFill/>
+        </p:spPr>
+        <p:txBody>
+          <a:bodyPr wrap="none" rtlCol="0">
+            <a:spAutoFit/>
+          </a:bodyPr>
+          <a:lstStyle/>
+          <a:p>
+            <a:r>
+              <a:rPr lang="es-ES" sz="700" i="1" dirty="0"/>
+              <a:t>DONE</a:t>
+            </a:r>
+          </a:p>
+        </p:txBody>
+      </p:sp>
+      <p:sp>
+        <p:nvSpPr>
+          <p:cNvPr id="109" name="CuadroTexto 108">
+            <a:extLst>
+              <a:ext uri="{FF2B5EF4-FFF2-40B4-BE49-F238E27FC236}">
+                <a16:creationId xmlns:a16="http://schemas.microsoft.com/office/drawing/2014/main" id="{9F12B3BF-2277-425C-8B5D-DBFF65455631}"/>
+              </a:ext>
+            </a:extLst>
+          </p:cNvPr>
+          <p:cNvSpPr txBox="1"/>
+          <p:nvPr/>
+        </p:nvSpPr>
+        <p:spPr>
+          <a:xfrm>
+            <a:off x="2778330" y="2440717"/>
+            <a:ext cx="553357" cy="200055"/>
+          </a:xfrm>
+          <a:prstGeom prst="rect">
+            <a:avLst/>
+          </a:prstGeom>
+          <a:noFill/>
+        </p:spPr>
+        <p:txBody>
+          <a:bodyPr wrap="none" rtlCol="0">
+            <a:spAutoFit/>
+          </a:bodyPr>
+          <a:lstStyle/>
+          <a:p>
+            <a:r>
+              <a:rPr lang="es-ES" sz="700" i="1" dirty="0"/>
+              <a:t>NEW_SEQ</a:t>
+            </a:r>
+          </a:p>
+        </p:txBody>
+      </p:sp>
+      <p:sp>
+        <p:nvSpPr>
+          <p:cNvPr id="114" name="CuadroTexto 113">
+            <a:extLst>
+              <a:ext uri="{FF2B5EF4-FFF2-40B4-BE49-F238E27FC236}">
+                <a16:creationId xmlns:a16="http://schemas.microsoft.com/office/drawing/2014/main" id="{A4FAA36D-503E-4D95-ADE1-C3CBE7C7AD9A}"/>
+              </a:ext>
+            </a:extLst>
+          </p:cNvPr>
+          <p:cNvSpPr txBox="1"/>
+          <p:nvPr/>
+        </p:nvSpPr>
+        <p:spPr>
+          <a:xfrm>
+            <a:off x="2793683" y="2148767"/>
+            <a:ext cx="575799" cy="200055"/>
+          </a:xfrm>
+          <a:prstGeom prst="rect">
+            <a:avLst/>
+          </a:prstGeom>
+          <a:noFill/>
+        </p:spPr>
+        <p:txBody>
+          <a:bodyPr wrap="none" rtlCol="0">
+            <a:spAutoFit/>
+          </a:bodyPr>
+          <a:lstStyle/>
+          <a:p>
+            <a:r>
+              <a:rPr lang="es-ES" sz="700" i="1" dirty="0"/>
+              <a:t>SEQUENCE</a:t>
+            </a:r>
+          </a:p>
+        </p:txBody>
+      </p:sp>
+    </p:spTree>
+    <p:extLst>
+      <p:ext uri="{BB962C8B-B14F-4D97-AF65-F5344CB8AC3E}">
+        <p14:creationId xmlns:p14="http://schemas.microsoft.com/office/powerpoint/2010/main" val="2951237072"/>
+      </p:ext>
+    </p:extLst>
+  </p:cSld>
+  <p:clrMapOvr>
+    <a:masterClrMapping/>
+  </p:clrMapOvr>
+</p:sld>
+</file>
+
 <file path=ppt/theme/theme1.xml><?xml version="1.0" encoding="utf-8"?>
 <a:theme xmlns:a="http://schemas.openxmlformats.org/drawingml/2006/main" name="Tema de Office">
   <a:themeElements>

</xml_diff>